<commit_message>
Add NCI baseline progress
</commit_message>
<xml_diff>
--- a/presentations/weekly_meetings/2024_11_21.pptx
+++ b/presentations/weekly_meetings/2024_11_21.pptx
@@ -5,18 +5,20 @@
     <p:sldMasterId id="2147483648" r:id="rId1"/>
   </p:sldMasterIdLst>
   <p:notesMasterIdLst>
-    <p:notesMasterId r:id="rId11"/>
+    <p:notesMasterId r:id="rId13"/>
   </p:notesMasterIdLst>
   <p:sldIdLst>
     <p:sldId id="477" r:id="rId2"/>
     <p:sldId id="754" r:id="rId3"/>
     <p:sldId id="800" r:id="rId4"/>
     <p:sldId id="802" r:id="rId5"/>
-    <p:sldId id="801" r:id="rId6"/>
-    <p:sldId id="803" r:id="rId7"/>
-    <p:sldId id="804" r:id="rId8"/>
-    <p:sldId id="787" r:id="rId9"/>
-    <p:sldId id="786" r:id="rId10"/>
+    <p:sldId id="805" r:id="rId6"/>
+    <p:sldId id="801" r:id="rId7"/>
+    <p:sldId id="806" r:id="rId8"/>
+    <p:sldId id="803" r:id="rId9"/>
+    <p:sldId id="804" r:id="rId10"/>
+    <p:sldId id="787" r:id="rId11"/>
+    <p:sldId id="786" r:id="rId12"/>
   </p:sldIdLst>
   <p:sldSz cx="12192000" cy="6858000"/>
   <p:notesSz cx="6858000" cy="9144000"/>
@@ -216,7 +218,7 @@
           <a:p>
             <a:fld id="{E933A773-0DCE-3544-BB67-D5FA58DF903C}" type="datetimeFigureOut">
               <a:rPr lang="en-US" smtClean="0"/>
-              <a:t>11/15/24</a:t>
+              <a:t>11/18/24</a:t>
             </a:fld>
             <a:endParaRPr lang="en-US"/>
           </a:p>
@@ -570,6 +572,249 @@
 </p:notes>
 </file>
 
+<file path=ppt/notesSlides/notesSlide10.xml><?xml version="1.0" encoding="utf-8"?>
+<p:notes xmlns:a="http://schemas.openxmlformats.org/drawingml/2006/main" xmlns:r="http://schemas.openxmlformats.org/officeDocument/2006/relationships" xmlns:p="http://schemas.openxmlformats.org/presentationml/2006/main">
+  <p:cSld>
+    <p:spTree>
+      <p:nvGrpSpPr>
+        <p:cNvPr id="1" name="">
+          <a:extLst>
+            <a:ext uri="{FF2B5EF4-FFF2-40B4-BE49-F238E27FC236}">
+              <a16:creationId xmlns:a16="http://schemas.microsoft.com/office/drawing/2014/main" id="{9BE7A472-7C6D-1D0D-8166-7DEE2D7E4098}"/>
+            </a:ext>
+          </a:extLst>
+        </p:cNvPr>
+        <p:cNvGrpSpPr/>
+        <p:nvPr/>
+      </p:nvGrpSpPr>
+      <p:grpSpPr>
+        <a:xfrm>
+          <a:off x="0" y="0"/>
+          <a:ext cx="0" cy="0"/>
+          <a:chOff x="0" y="0"/>
+          <a:chExt cx="0" cy="0"/>
+        </a:xfrm>
+      </p:grpSpPr>
+      <p:sp>
+        <p:nvSpPr>
+          <p:cNvPr id="2" name="Slide Image Placeholder 1">
+            <a:extLst>
+              <a:ext uri="{FF2B5EF4-FFF2-40B4-BE49-F238E27FC236}">
+                <a16:creationId xmlns:a16="http://schemas.microsoft.com/office/drawing/2014/main" id="{59263287-124F-3C48-EFD6-A54B705ACCA2}"/>
+              </a:ext>
+            </a:extLst>
+          </p:cNvPr>
+          <p:cNvSpPr>
+            <a:spLocks noGrp="1" noRot="1" noChangeAspect="1"/>
+          </p:cNvSpPr>
+          <p:nvPr>
+            <p:ph type="sldImg"/>
+          </p:nvPr>
+        </p:nvSpPr>
+        <p:spPr/>
+      </p:sp>
+      <p:sp>
+        <p:nvSpPr>
+          <p:cNvPr id="3" name="Notes Placeholder 2">
+            <a:extLst>
+              <a:ext uri="{FF2B5EF4-FFF2-40B4-BE49-F238E27FC236}">
+                <a16:creationId xmlns:a16="http://schemas.microsoft.com/office/drawing/2014/main" id="{43CCBFB9-D3BD-0989-5862-F9B24D114053}"/>
+              </a:ext>
+            </a:extLst>
+          </p:cNvPr>
+          <p:cNvSpPr>
+            <a:spLocks noGrp="1"/>
+          </p:cNvSpPr>
+          <p:nvPr>
+            <p:ph type="body" idx="1"/>
+          </p:nvPr>
+        </p:nvSpPr>
+        <p:spPr/>
+        <p:txBody>
+          <a:bodyPr/>
+          <a:lstStyle/>
+          <a:p>
+            <a:pPr marL="0" marR="0" lvl="0" indent="0" algn="l" defTabSz="914400" rtl="0" eaLnBrk="1" fontAlgn="auto" latinLnBrk="0" hangingPunct="1">
+              <a:lnSpc>
+                <a:spcPct val="100000"/>
+              </a:lnSpc>
+              <a:spcBef>
+                <a:spcPts val="0"/>
+              </a:spcBef>
+              <a:spcAft>
+                <a:spcPts val="0"/>
+              </a:spcAft>
+              <a:buClrTx/>
+              <a:buSzTx/>
+              <a:buFont typeface="+mj-lt"/>
+              <a:buNone/>
+              <a:tabLst/>
+              <a:defRPr/>
+            </a:pPr>
+            <a:endParaRPr lang="en-US" b="0" i="0" u="none" strike="noStrike" dirty="0">
+              <a:solidFill>
+                <a:srgbClr val="212121"/>
+              </a:solidFill>
+              <a:effectLst/>
+              <a:latin typeface="Cambria" panose="02040503050406030204" pitchFamily="18" charset="0"/>
+            </a:endParaRPr>
+          </a:p>
+        </p:txBody>
+      </p:sp>
+      <p:sp>
+        <p:nvSpPr>
+          <p:cNvPr id="4" name="Slide Number Placeholder 3">
+            <a:extLst>
+              <a:ext uri="{FF2B5EF4-FFF2-40B4-BE49-F238E27FC236}">
+                <a16:creationId xmlns:a16="http://schemas.microsoft.com/office/drawing/2014/main" id="{7483D8B0-5836-C834-58B4-BE6969D92772}"/>
+              </a:ext>
+            </a:extLst>
+          </p:cNvPr>
+          <p:cNvSpPr>
+            <a:spLocks noGrp="1"/>
+          </p:cNvSpPr>
+          <p:nvPr>
+            <p:ph type="sldNum" sz="quarter" idx="5"/>
+          </p:nvPr>
+        </p:nvSpPr>
+        <p:spPr/>
+        <p:txBody>
+          <a:bodyPr/>
+          <a:lstStyle/>
+          <a:p>
+            <a:fld id="{061BAA8C-FDC6-D345-B4E0-3B02449209FB}" type="slidenum">
+              <a:rPr lang="en-US" smtClean="0"/>
+              <a:t>10</a:t>
+            </a:fld>
+            <a:endParaRPr lang="en-US"/>
+          </a:p>
+        </p:txBody>
+      </p:sp>
+    </p:spTree>
+    <p:extLst>
+      <p:ext uri="{BB962C8B-B14F-4D97-AF65-F5344CB8AC3E}">
+        <p14:creationId xmlns:p14="http://schemas.microsoft.com/office/powerpoint/2010/main" val="2053035694"/>
+      </p:ext>
+    </p:extLst>
+  </p:cSld>
+  <p:clrMapOvr>
+    <a:masterClrMapping/>
+  </p:clrMapOvr>
+</p:notes>
+</file>
+
+<file path=ppt/notesSlides/notesSlide11.xml><?xml version="1.0" encoding="utf-8"?>
+<p:notes xmlns:a="http://schemas.openxmlformats.org/drawingml/2006/main" xmlns:r="http://schemas.openxmlformats.org/officeDocument/2006/relationships" xmlns:p="http://schemas.openxmlformats.org/presentationml/2006/main">
+  <p:cSld>
+    <p:spTree>
+      <p:nvGrpSpPr>
+        <p:cNvPr id="1" name="">
+          <a:extLst>
+            <a:ext uri="{FF2B5EF4-FFF2-40B4-BE49-F238E27FC236}">
+              <a16:creationId xmlns:a16="http://schemas.microsoft.com/office/drawing/2014/main" id="{3415C166-0F50-E043-8950-9F266C4565AE}"/>
+            </a:ext>
+          </a:extLst>
+        </p:cNvPr>
+        <p:cNvGrpSpPr/>
+        <p:nvPr/>
+      </p:nvGrpSpPr>
+      <p:grpSpPr>
+        <a:xfrm>
+          <a:off x="0" y="0"/>
+          <a:ext cx="0" cy="0"/>
+          <a:chOff x="0" y="0"/>
+          <a:chExt cx="0" cy="0"/>
+        </a:xfrm>
+      </p:grpSpPr>
+      <p:sp>
+        <p:nvSpPr>
+          <p:cNvPr id="2" name="Slide Image Placeholder 1">
+            <a:extLst>
+              <a:ext uri="{FF2B5EF4-FFF2-40B4-BE49-F238E27FC236}">
+                <a16:creationId xmlns:a16="http://schemas.microsoft.com/office/drawing/2014/main" id="{1E497E09-6D11-D0BA-D2D1-5B08FB997731}"/>
+              </a:ext>
+            </a:extLst>
+          </p:cNvPr>
+          <p:cNvSpPr>
+            <a:spLocks noGrp="1" noRot="1" noChangeAspect="1"/>
+          </p:cNvSpPr>
+          <p:nvPr>
+            <p:ph type="sldImg"/>
+          </p:nvPr>
+        </p:nvSpPr>
+        <p:spPr/>
+      </p:sp>
+      <p:sp>
+        <p:nvSpPr>
+          <p:cNvPr id="3" name="Notes Placeholder 2">
+            <a:extLst>
+              <a:ext uri="{FF2B5EF4-FFF2-40B4-BE49-F238E27FC236}">
+                <a16:creationId xmlns:a16="http://schemas.microsoft.com/office/drawing/2014/main" id="{9336C4A5-58A4-D062-54A6-1D67A978E992}"/>
+              </a:ext>
+            </a:extLst>
+          </p:cNvPr>
+          <p:cNvSpPr>
+            <a:spLocks noGrp="1"/>
+          </p:cNvSpPr>
+          <p:nvPr>
+            <p:ph type="body" idx="1"/>
+          </p:nvPr>
+        </p:nvSpPr>
+        <p:spPr/>
+        <p:txBody>
+          <a:bodyPr/>
+          <a:lstStyle/>
+          <a:p>
+            <a:pPr marL="1371600" lvl="2" indent="-457200">
+              <a:buFont typeface="+mj-lt"/>
+              <a:buAutoNum type="alphaLcParenR"/>
+            </a:pPr>
+            <a:endParaRPr lang="en-US" dirty="0"/>
+          </a:p>
+        </p:txBody>
+      </p:sp>
+      <p:sp>
+        <p:nvSpPr>
+          <p:cNvPr id="4" name="Slide Number Placeholder 3">
+            <a:extLst>
+              <a:ext uri="{FF2B5EF4-FFF2-40B4-BE49-F238E27FC236}">
+                <a16:creationId xmlns:a16="http://schemas.microsoft.com/office/drawing/2014/main" id="{9F3FD3E1-ECA8-7789-76B9-A150DB6276EE}"/>
+              </a:ext>
+            </a:extLst>
+          </p:cNvPr>
+          <p:cNvSpPr>
+            <a:spLocks noGrp="1"/>
+          </p:cNvSpPr>
+          <p:nvPr>
+            <p:ph type="sldNum" sz="quarter" idx="5"/>
+          </p:nvPr>
+        </p:nvSpPr>
+        <p:spPr/>
+        <p:txBody>
+          <a:bodyPr/>
+          <a:lstStyle/>
+          <a:p>
+            <a:fld id="{061BAA8C-FDC6-D345-B4E0-3B02449209FB}" type="slidenum">
+              <a:rPr lang="en-US" smtClean="0"/>
+              <a:t>11</a:t>
+            </a:fld>
+            <a:endParaRPr lang="en-US"/>
+          </a:p>
+        </p:txBody>
+      </p:sp>
+    </p:spTree>
+    <p:extLst>
+      <p:ext uri="{BB962C8B-B14F-4D97-AF65-F5344CB8AC3E}">
+        <p14:creationId xmlns:p14="http://schemas.microsoft.com/office/powerpoint/2010/main" val="3100438651"/>
+      </p:ext>
+    </p:extLst>
+  </p:cSld>
+  <p:clrMapOvr>
+    <a:masterClrMapping/>
+  </p:clrMapOvr>
+</p:notes>
+</file>
+
 <file path=ppt/notesSlides/notesSlide2.xml><?xml version="1.0" encoding="utf-8"?>
 <p:notes xmlns:a="http://schemas.openxmlformats.org/drawingml/2006/main" xmlns:r="http://schemas.openxmlformats.org/officeDocument/2006/relationships" xmlns:p="http://schemas.openxmlformats.org/presentationml/2006/main">
   <p:cSld>
@@ -788,6 +1033,81 @@
                 <a:effectLst/>
                 <a:latin typeface="Aptos" panose="020B0004020202020204" pitchFamily="34" charset="0"/>
               </a:rPr>
+              <a:t>Was able to move unspecified </a:t>
+            </a:r>
+            <a:r>
+              <a:rPr lang="en-US" sz="1200" b="1" i="0" u="none" strike="noStrike" dirty="0" err="1">
+                <a:solidFill>
+                  <a:srgbClr val="212121"/>
+                </a:solidFill>
+                <a:effectLst/>
+                <a:latin typeface="Aptos" panose="020B0004020202020204" pitchFamily="34" charset="0"/>
+              </a:rPr>
+              <a:t>irAEs</a:t>
+            </a:r>
+            <a:r>
+              <a:rPr lang="en-US" sz="1200" b="1" i="0" u="none" strike="noStrike" dirty="0">
+                <a:solidFill>
+                  <a:srgbClr val="212121"/>
+                </a:solidFill>
+                <a:effectLst/>
+                <a:latin typeface="Aptos" panose="020B0004020202020204" pitchFamily="34" charset="0"/>
+              </a:rPr>
+              <a:t> to specific ones, this helped me actually test pneumonitis/rheumatoid and likely contributed to ~different results I now see for skin/thyroid as well!!</a:t>
+            </a:r>
+          </a:p>
+          <a:p>
+            <a:pPr marL="0" marR="0" lvl="0" indent="0" algn="l" defTabSz="914400" rtl="0" eaLnBrk="1" fontAlgn="auto" latinLnBrk="0" hangingPunct="1">
+              <a:lnSpc>
+                <a:spcPct val="100000"/>
+              </a:lnSpc>
+              <a:spcBef>
+                <a:spcPts val="0"/>
+              </a:spcBef>
+              <a:spcAft>
+                <a:spcPts val="0"/>
+              </a:spcAft>
+              <a:buClrTx/>
+              <a:buSzTx/>
+              <a:buFont typeface="+mj-lt"/>
+              <a:buNone/>
+              <a:tabLst/>
+              <a:defRPr/>
+            </a:pPr>
+            <a:endParaRPr lang="en-US" sz="1200" b="1" i="0" u="none" strike="noStrike" dirty="0">
+              <a:solidFill>
+                <a:srgbClr val="212121"/>
+              </a:solidFill>
+              <a:effectLst/>
+              <a:latin typeface="Aptos" panose="020B0004020202020204" pitchFamily="34" charset="0"/>
+            </a:endParaRPr>
+          </a:p>
+          <a:p>
+            <a:pPr marL="0" marR="0" lvl="0" indent="0" algn="l" defTabSz="914400" rtl="0" eaLnBrk="1" fontAlgn="auto" latinLnBrk="0" hangingPunct="1">
+              <a:lnSpc>
+                <a:spcPct val="100000"/>
+              </a:lnSpc>
+              <a:spcBef>
+                <a:spcPts val="0"/>
+              </a:spcBef>
+              <a:spcAft>
+                <a:spcPts val="0"/>
+              </a:spcAft>
+              <a:buClrTx/>
+              <a:buSzTx/>
+              <a:buFont typeface="+mj-lt"/>
+              <a:buNone/>
+              <a:tabLst/>
+              <a:defRPr/>
+            </a:pPr>
+            <a:r>
+              <a:rPr lang="en-US" sz="1200" b="1" i="0" u="none" strike="noStrike" dirty="0">
+                <a:solidFill>
+                  <a:srgbClr val="212121"/>
+                </a:solidFill>
+                <a:effectLst/>
+                <a:latin typeface="Aptos" panose="020B0004020202020204" pitchFamily="34" charset="0"/>
+              </a:rPr>
               <a:t>Still not sure why head/neck no </a:t>
             </a:r>
             <a:r>
@@ -994,6 +1314,304 @@
         <p:cNvPr id="1" name="">
           <a:extLst>
             <a:ext uri="{FF2B5EF4-FFF2-40B4-BE49-F238E27FC236}">
+              <a16:creationId xmlns:a16="http://schemas.microsoft.com/office/drawing/2014/main" id="{52E4AC3C-F0BE-E16F-ABF5-A1E3676649CA}"/>
+            </a:ext>
+          </a:extLst>
+        </p:cNvPr>
+        <p:cNvGrpSpPr/>
+        <p:nvPr/>
+      </p:nvGrpSpPr>
+      <p:grpSpPr>
+        <a:xfrm>
+          <a:off x="0" y="0"/>
+          <a:ext cx="0" cy="0"/>
+          <a:chOff x="0" y="0"/>
+          <a:chExt cx="0" cy="0"/>
+        </a:xfrm>
+      </p:grpSpPr>
+      <p:sp>
+        <p:nvSpPr>
+          <p:cNvPr id="2" name="Slide Image Placeholder 1">
+            <a:extLst>
+              <a:ext uri="{FF2B5EF4-FFF2-40B4-BE49-F238E27FC236}">
+                <a16:creationId xmlns:a16="http://schemas.microsoft.com/office/drawing/2014/main" id="{44445A72-C693-727D-2DC4-4A42FED2E15D}"/>
+              </a:ext>
+            </a:extLst>
+          </p:cNvPr>
+          <p:cNvSpPr>
+            <a:spLocks noGrp="1" noRot="1" noChangeAspect="1"/>
+          </p:cNvSpPr>
+          <p:nvPr>
+            <p:ph type="sldImg"/>
+          </p:nvPr>
+        </p:nvSpPr>
+        <p:spPr/>
+      </p:sp>
+      <p:sp>
+        <p:nvSpPr>
+          <p:cNvPr id="3" name="Notes Placeholder 2">
+            <a:extLst>
+              <a:ext uri="{FF2B5EF4-FFF2-40B4-BE49-F238E27FC236}">
+                <a16:creationId xmlns:a16="http://schemas.microsoft.com/office/drawing/2014/main" id="{B93AA8F3-0FF8-C5D7-B8CA-584D866D5336}"/>
+              </a:ext>
+            </a:extLst>
+          </p:cNvPr>
+          <p:cNvSpPr>
+            <a:spLocks noGrp="1"/>
+          </p:cNvSpPr>
+          <p:nvPr>
+            <p:ph type="body" idx="1"/>
+          </p:nvPr>
+        </p:nvSpPr>
+        <p:spPr/>
+        <p:txBody>
+          <a:bodyPr/>
+          <a:lstStyle/>
+          <a:p>
+            <a:pPr marL="0" marR="0" lvl="0" indent="0" algn="l" defTabSz="914400" rtl="0" eaLnBrk="1" fontAlgn="auto" latinLnBrk="0" hangingPunct="1">
+              <a:lnSpc>
+                <a:spcPct val="100000"/>
+              </a:lnSpc>
+              <a:spcBef>
+                <a:spcPts val="0"/>
+              </a:spcBef>
+              <a:spcAft>
+                <a:spcPts val="0"/>
+              </a:spcAft>
+              <a:buClrTx/>
+              <a:buSzTx/>
+              <a:buFont typeface="+mj-lt"/>
+              <a:buNone/>
+              <a:tabLst/>
+              <a:defRPr/>
+            </a:pPr>
+            <a:r>
+              <a:rPr lang="en-US" sz="1200" b="1" i="0" u="none" strike="noStrike" dirty="0">
+                <a:solidFill>
+                  <a:srgbClr val="212121"/>
+                </a:solidFill>
+                <a:effectLst/>
+                <a:latin typeface="Aptos" panose="020B0004020202020204" pitchFamily="34" charset="0"/>
+              </a:rPr>
+              <a:t>Significance (p) here is from testing if a specific </a:t>
+            </a:r>
+            <a:r>
+              <a:rPr lang="en-US" sz="1200" b="1" i="0" u="none" strike="noStrike" dirty="0" err="1">
+                <a:solidFill>
+                  <a:srgbClr val="212121"/>
+                </a:solidFill>
+                <a:effectLst/>
+                <a:latin typeface="Aptos" panose="020B0004020202020204" pitchFamily="34" charset="0"/>
+              </a:rPr>
+              <a:t>irAE</a:t>
+            </a:r>
+            <a:r>
+              <a:rPr lang="en-US" sz="1200" b="1" i="0" u="none" strike="noStrike" dirty="0">
+                <a:solidFill>
+                  <a:srgbClr val="212121"/>
+                </a:solidFill>
+                <a:effectLst/>
+                <a:latin typeface="Aptos" panose="020B0004020202020204" pitchFamily="34" charset="0"/>
+              </a:rPr>
+              <a:t> type differs in that PC#</a:t>
+            </a:r>
+          </a:p>
+          <a:p>
+            <a:pPr marL="0" marR="0" lvl="0" indent="0" algn="l" defTabSz="914400" rtl="0" eaLnBrk="1" fontAlgn="auto" latinLnBrk="0" hangingPunct="1">
+              <a:lnSpc>
+                <a:spcPct val="100000"/>
+              </a:lnSpc>
+              <a:spcBef>
+                <a:spcPts val="0"/>
+              </a:spcBef>
+              <a:spcAft>
+                <a:spcPts val="0"/>
+              </a:spcAft>
+              <a:buClrTx/>
+              <a:buSzTx/>
+              <a:buFont typeface="+mj-lt"/>
+              <a:buNone/>
+              <a:tabLst/>
+              <a:defRPr/>
+            </a:pPr>
+            <a:r>
+              <a:rPr lang="en-US" sz="1200" b="1" i="0" u="none" strike="noStrike" dirty="0">
+                <a:solidFill>
+                  <a:srgbClr val="212121"/>
+                </a:solidFill>
+                <a:effectLst/>
+                <a:latin typeface="Aptos" panose="020B0004020202020204" pitchFamily="34" charset="0"/>
+              </a:rPr>
+              <a:t>Features chosen by unadjusted </a:t>
+            </a:r>
+            <a:r>
+              <a:rPr lang="en-US" sz="1200" b="1" i="0" u="none" strike="noStrike" dirty="0" err="1">
+                <a:solidFill>
+                  <a:srgbClr val="212121"/>
+                </a:solidFill>
+                <a:effectLst/>
+                <a:latin typeface="Aptos" panose="020B0004020202020204" pitchFamily="34" charset="0"/>
+              </a:rPr>
+              <a:t>pval</a:t>
+            </a:r>
+            <a:r>
+              <a:rPr lang="en-US" sz="1200" b="1" i="0" u="none" strike="noStrike" dirty="0">
+                <a:solidFill>
+                  <a:srgbClr val="212121"/>
+                </a:solidFill>
+                <a:effectLst/>
+                <a:latin typeface="Aptos" panose="020B0004020202020204" pitchFamily="34" charset="0"/>
+              </a:rPr>
+              <a:t> &lt; 0.2 to get more features and have less NAs ideally for each </a:t>
+            </a:r>
+            <a:r>
+              <a:rPr lang="en-US" sz="1200" b="1" i="0" u="none" strike="noStrike" dirty="0" err="1">
+                <a:solidFill>
+                  <a:srgbClr val="212121"/>
+                </a:solidFill>
+                <a:effectLst/>
+                <a:latin typeface="Aptos" panose="020B0004020202020204" pitchFamily="34" charset="0"/>
+              </a:rPr>
+              <a:t>irAE</a:t>
+            </a:r>
+            <a:r>
+              <a:rPr lang="en-US" sz="1200" b="1" i="0" u="none" strike="noStrike" dirty="0">
+                <a:solidFill>
+                  <a:srgbClr val="212121"/>
+                </a:solidFill>
+                <a:effectLst/>
+                <a:latin typeface="Aptos" panose="020B0004020202020204" pitchFamily="34" charset="0"/>
+              </a:rPr>
+              <a:t> type yes vs. no</a:t>
+            </a:r>
+          </a:p>
+          <a:p>
+            <a:pPr marL="0" marR="0" lvl="0" indent="0" algn="l" defTabSz="914400" rtl="0" eaLnBrk="1" fontAlgn="auto" latinLnBrk="0" hangingPunct="1">
+              <a:lnSpc>
+                <a:spcPct val="100000"/>
+              </a:lnSpc>
+              <a:spcBef>
+                <a:spcPts val="0"/>
+              </a:spcBef>
+              <a:spcAft>
+                <a:spcPts val="0"/>
+              </a:spcAft>
+              <a:buClrTx/>
+              <a:buSzTx/>
+              <a:buFont typeface="+mj-lt"/>
+              <a:buNone/>
+              <a:tabLst/>
+              <a:defRPr/>
+            </a:pPr>
+            <a:endParaRPr lang="en-US" sz="1200" b="1" i="0" u="none" strike="noStrike" dirty="0">
+              <a:solidFill>
+                <a:srgbClr val="212121"/>
+              </a:solidFill>
+              <a:effectLst/>
+              <a:latin typeface="Aptos" panose="020B0004020202020204" pitchFamily="34" charset="0"/>
+            </a:endParaRPr>
+          </a:p>
+          <a:p>
+            <a:pPr marL="0" marR="0" lvl="0" indent="0" algn="l" defTabSz="914400" rtl="0" eaLnBrk="1" fontAlgn="auto" latinLnBrk="0" hangingPunct="1">
+              <a:lnSpc>
+                <a:spcPct val="100000"/>
+              </a:lnSpc>
+              <a:spcBef>
+                <a:spcPts val="0"/>
+              </a:spcBef>
+              <a:spcAft>
+                <a:spcPts val="0"/>
+              </a:spcAft>
+              <a:buClrTx/>
+              <a:buSzTx/>
+              <a:buFont typeface="+mj-lt"/>
+              <a:buNone/>
+              <a:tabLst/>
+              <a:defRPr/>
+            </a:pPr>
+            <a:r>
+              <a:rPr lang="en-US" sz="1200" b="1" i="0" u="none" strike="noStrike" dirty="0">
+                <a:solidFill>
+                  <a:srgbClr val="212121"/>
+                </a:solidFill>
+                <a:effectLst/>
+                <a:latin typeface="Aptos" panose="020B0004020202020204" pitchFamily="34" charset="0"/>
+              </a:rPr>
+              <a:t>This isn’t concordant really with Bukhari paper that showed CD4 subsets and CD8 </a:t>
+            </a:r>
+            <a:r>
+              <a:rPr lang="en-US" sz="1200" b="1" i="0" u="none" strike="noStrike" dirty="0" err="1">
+                <a:solidFill>
+                  <a:srgbClr val="212121"/>
+                </a:solidFill>
+                <a:effectLst/>
+                <a:latin typeface="Aptos" panose="020B0004020202020204" pitchFamily="34" charset="0"/>
+              </a:rPr>
+              <a:t>Tcm</a:t>
+            </a:r>
+            <a:r>
+              <a:rPr lang="en-US" sz="1200" b="1" i="0" u="none" strike="noStrike" dirty="0">
+                <a:solidFill>
+                  <a:srgbClr val="212121"/>
+                </a:solidFill>
+                <a:effectLst/>
+                <a:latin typeface="Aptos" panose="020B0004020202020204" pitchFamily="34" charset="0"/>
+              </a:rPr>
+              <a:t> results (I don’t know what would correspond to CD4 subsets here AND for their arthritis CD8 TCM that’s not a contributing feature here to rheumatoid</a:t>
+            </a:r>
+          </a:p>
+        </p:txBody>
+      </p:sp>
+      <p:sp>
+        <p:nvSpPr>
+          <p:cNvPr id="4" name="Slide Number Placeholder 3">
+            <a:extLst>
+              <a:ext uri="{FF2B5EF4-FFF2-40B4-BE49-F238E27FC236}">
+                <a16:creationId xmlns:a16="http://schemas.microsoft.com/office/drawing/2014/main" id="{BC016B1F-37FD-9964-C1A5-C6095173A8FB}"/>
+              </a:ext>
+            </a:extLst>
+          </p:cNvPr>
+          <p:cNvSpPr>
+            <a:spLocks noGrp="1"/>
+          </p:cNvSpPr>
+          <p:nvPr>
+            <p:ph type="sldNum" sz="quarter" idx="5"/>
+          </p:nvPr>
+        </p:nvSpPr>
+        <p:spPr/>
+        <p:txBody>
+          <a:bodyPr/>
+          <a:lstStyle/>
+          <a:p>
+            <a:fld id="{061BAA8C-FDC6-D345-B4E0-3B02449209FB}" type="slidenum">
+              <a:rPr lang="en-US" smtClean="0"/>
+              <a:t>5</a:t>
+            </a:fld>
+            <a:endParaRPr lang="en-US"/>
+          </a:p>
+        </p:txBody>
+      </p:sp>
+    </p:spTree>
+    <p:extLst>
+      <p:ext uri="{BB962C8B-B14F-4D97-AF65-F5344CB8AC3E}">
+        <p14:creationId xmlns:p14="http://schemas.microsoft.com/office/powerpoint/2010/main" val="746910215"/>
+      </p:ext>
+    </p:extLst>
+  </p:cSld>
+  <p:clrMapOvr>
+    <a:masterClrMapping/>
+  </p:clrMapOvr>
+</p:notes>
+</file>
+
+<file path=ppt/notesSlides/notesSlide6.xml><?xml version="1.0" encoding="utf-8"?>
+<p:notes xmlns:a="http://schemas.openxmlformats.org/drawingml/2006/main" xmlns:r="http://schemas.openxmlformats.org/officeDocument/2006/relationships" xmlns:p="http://schemas.openxmlformats.org/presentationml/2006/main">
+  <p:cSld>
+    <p:spTree>
+      <p:nvGrpSpPr>
+        <p:cNvPr id="1" name="">
+          <a:extLst>
+            <a:ext uri="{FF2B5EF4-FFF2-40B4-BE49-F238E27FC236}">
               <a16:creationId xmlns:a16="http://schemas.microsoft.com/office/drawing/2014/main" id="{227788F0-C829-4A34-FE8D-542F2DDCC311}"/>
             </a:ext>
           </a:extLst>
@@ -1101,7 +1719,7 @@
           <a:p>
             <a:fld id="{061BAA8C-FDC6-D345-B4E0-3B02449209FB}" type="slidenum">
               <a:rPr lang="en-US" smtClean="0"/>
-              <a:t>5</a:t>
+              <a:t>6</a:t>
             </a:fld>
             <a:endParaRPr lang="en-US"/>
           </a:p>
@@ -1120,7 +1738,190 @@
 </p:notes>
 </file>
 
-<file path=ppt/notesSlides/notesSlide6.xml><?xml version="1.0" encoding="utf-8"?>
+<file path=ppt/notesSlides/notesSlide7.xml><?xml version="1.0" encoding="utf-8"?>
+<p:notes xmlns:a="http://schemas.openxmlformats.org/drawingml/2006/main" xmlns:r="http://schemas.openxmlformats.org/officeDocument/2006/relationships" xmlns:p="http://schemas.openxmlformats.org/presentationml/2006/main">
+  <p:cSld>
+    <p:spTree>
+      <p:nvGrpSpPr>
+        <p:cNvPr id="1" name="">
+          <a:extLst>
+            <a:ext uri="{FF2B5EF4-FFF2-40B4-BE49-F238E27FC236}">
+              <a16:creationId xmlns:a16="http://schemas.microsoft.com/office/drawing/2014/main" id="{923B5769-3158-A76C-3822-FF4D1B900638}"/>
+            </a:ext>
+          </a:extLst>
+        </p:cNvPr>
+        <p:cNvGrpSpPr/>
+        <p:nvPr/>
+      </p:nvGrpSpPr>
+      <p:grpSpPr>
+        <a:xfrm>
+          <a:off x="0" y="0"/>
+          <a:ext cx="0" cy="0"/>
+          <a:chOff x="0" y="0"/>
+          <a:chExt cx="0" cy="0"/>
+        </a:xfrm>
+      </p:grpSpPr>
+      <p:sp>
+        <p:nvSpPr>
+          <p:cNvPr id="2" name="Slide Image Placeholder 1">
+            <a:extLst>
+              <a:ext uri="{FF2B5EF4-FFF2-40B4-BE49-F238E27FC236}">
+                <a16:creationId xmlns:a16="http://schemas.microsoft.com/office/drawing/2014/main" id="{3C339F45-8C1D-8598-D502-86A7CF1F8C83}"/>
+              </a:ext>
+            </a:extLst>
+          </p:cNvPr>
+          <p:cNvSpPr>
+            <a:spLocks noGrp="1" noRot="1" noChangeAspect="1"/>
+          </p:cNvSpPr>
+          <p:nvPr>
+            <p:ph type="sldImg"/>
+          </p:nvPr>
+        </p:nvSpPr>
+        <p:spPr/>
+      </p:sp>
+      <p:sp>
+        <p:nvSpPr>
+          <p:cNvPr id="3" name="Notes Placeholder 2">
+            <a:extLst>
+              <a:ext uri="{FF2B5EF4-FFF2-40B4-BE49-F238E27FC236}">
+                <a16:creationId xmlns:a16="http://schemas.microsoft.com/office/drawing/2014/main" id="{69EA4DDA-00E8-D88C-5D07-70DC4877066D}"/>
+              </a:ext>
+            </a:extLst>
+          </p:cNvPr>
+          <p:cNvSpPr>
+            <a:spLocks noGrp="1"/>
+          </p:cNvSpPr>
+          <p:nvPr>
+            <p:ph type="body" idx="1"/>
+          </p:nvPr>
+        </p:nvSpPr>
+        <p:spPr/>
+        <p:txBody>
+          <a:bodyPr/>
+          <a:lstStyle/>
+          <a:p>
+            <a:pPr marL="0" marR="0" lvl="0" indent="0" algn="l" defTabSz="914400" rtl="0" eaLnBrk="1" fontAlgn="auto" latinLnBrk="0" hangingPunct="1">
+              <a:lnSpc>
+                <a:spcPct val="100000"/>
+              </a:lnSpc>
+              <a:spcBef>
+                <a:spcPts val="0"/>
+              </a:spcBef>
+              <a:spcAft>
+                <a:spcPts val="0"/>
+              </a:spcAft>
+              <a:buClrTx/>
+              <a:buSzTx/>
+              <a:buFont typeface="+mj-lt"/>
+              <a:buNone/>
+              <a:tabLst/>
+              <a:defRPr/>
+            </a:pPr>
+            <a:r>
+              <a:rPr lang="en-US" sz="1200" b="0" i="0" u="none" strike="noStrike" dirty="0">
+                <a:solidFill>
+                  <a:srgbClr val="212121"/>
+                </a:solidFill>
+                <a:effectLst/>
+                <a:latin typeface="Aptos" panose="020B0004020202020204" pitchFamily="34" charset="0"/>
+              </a:rPr>
+              <a:t>43 total subjects</a:t>
+            </a:r>
+          </a:p>
+          <a:p>
+            <a:pPr marL="0" marR="0" lvl="0" indent="0" algn="l" defTabSz="914400" rtl="0" eaLnBrk="1" fontAlgn="auto" latinLnBrk="0" hangingPunct="1">
+              <a:lnSpc>
+                <a:spcPct val="100000"/>
+              </a:lnSpc>
+              <a:spcBef>
+                <a:spcPts val="0"/>
+              </a:spcBef>
+              <a:spcAft>
+                <a:spcPts val="0"/>
+              </a:spcAft>
+              <a:buClrTx/>
+              <a:buSzTx/>
+              <a:buFont typeface="+mj-lt"/>
+              <a:buNone/>
+              <a:tabLst/>
+              <a:defRPr/>
+            </a:pPr>
+            <a:r>
+              <a:rPr lang="en-US" sz="1200" b="1" i="0" u="none" strike="noStrike" dirty="0">
+                <a:solidFill>
+                  <a:srgbClr val="212121"/>
+                </a:solidFill>
+                <a:effectLst/>
+                <a:latin typeface="Aptos" panose="020B0004020202020204" pitchFamily="34" charset="0"/>
+              </a:rPr>
+              <a:t>I think contributing to not seeing this until now was the unspecified </a:t>
+            </a:r>
+            <a:r>
+              <a:rPr lang="en-US" sz="1200" b="1" i="0" u="none" strike="noStrike" dirty="0" err="1">
+                <a:solidFill>
+                  <a:srgbClr val="212121"/>
+                </a:solidFill>
+                <a:effectLst/>
+                <a:latin typeface="Aptos" panose="020B0004020202020204" pitchFamily="34" charset="0"/>
+              </a:rPr>
+              <a:t>irAEs</a:t>
+            </a:r>
+            <a:r>
+              <a:rPr lang="en-US" sz="1200" b="1" i="0" u="none" strike="noStrike" dirty="0">
+                <a:solidFill>
+                  <a:srgbClr val="212121"/>
+                </a:solidFill>
+                <a:effectLst/>
+                <a:latin typeface="Aptos" panose="020B0004020202020204" pitchFamily="34" charset="0"/>
+              </a:rPr>
+              <a:t> that then added to these categories…</a:t>
+            </a:r>
+          </a:p>
+        </p:txBody>
+      </p:sp>
+      <p:sp>
+        <p:nvSpPr>
+          <p:cNvPr id="4" name="Slide Number Placeholder 3">
+            <a:extLst>
+              <a:ext uri="{FF2B5EF4-FFF2-40B4-BE49-F238E27FC236}">
+                <a16:creationId xmlns:a16="http://schemas.microsoft.com/office/drawing/2014/main" id="{D37E6208-CEE6-E746-B753-5F21510F7FBA}"/>
+              </a:ext>
+            </a:extLst>
+          </p:cNvPr>
+          <p:cNvSpPr>
+            <a:spLocks noGrp="1"/>
+          </p:cNvSpPr>
+          <p:nvPr>
+            <p:ph type="sldNum" sz="quarter" idx="5"/>
+          </p:nvPr>
+        </p:nvSpPr>
+        <p:spPr/>
+        <p:txBody>
+          <a:bodyPr/>
+          <a:lstStyle/>
+          <a:p>
+            <a:fld id="{061BAA8C-FDC6-D345-B4E0-3B02449209FB}" type="slidenum">
+              <a:rPr lang="en-US" smtClean="0"/>
+              <a:t>7</a:t>
+            </a:fld>
+            <a:endParaRPr lang="en-US"/>
+          </a:p>
+        </p:txBody>
+      </p:sp>
+    </p:spTree>
+    <p:extLst>
+      <p:ext uri="{BB962C8B-B14F-4D97-AF65-F5344CB8AC3E}">
+        <p14:creationId xmlns:p14="http://schemas.microsoft.com/office/powerpoint/2010/main" val="1798178479"/>
+      </p:ext>
+    </p:extLst>
+  </p:cSld>
+  <p:clrMapOvr>
+    <a:masterClrMapping/>
+  </p:clrMapOvr>
+</p:notes>
+</file>
+
+<file path=ppt/notesSlides/notesSlide8.xml><?xml version="1.0" encoding="utf-8"?>
 <p:notes xmlns:a="http://schemas.openxmlformats.org/drawingml/2006/main" xmlns:r="http://schemas.openxmlformats.org/officeDocument/2006/relationships" xmlns:p="http://schemas.openxmlformats.org/presentationml/2006/main">
   <p:cSld>
     <p:spTree>
@@ -1207,7 +2008,7 @@
                 <a:effectLst/>
                 <a:latin typeface="Aptos" panose="020B0004020202020204" pitchFamily="34" charset="0"/>
               </a:rPr>
-              <a:t>Both have CCR6, PD1, CD56…</a:t>
+              <a:t>Has CCR6, PD1, CD56…</a:t>
             </a:r>
           </a:p>
           <a:p>
@@ -1262,7 +2063,7 @@
                 <a:effectLst/>
                 <a:latin typeface="Aptos" panose="020B0004020202020204" pitchFamily="34" charset="0"/>
               </a:rPr>
-              <a:t>But neither have data easily accessible</a:t>
+              <a:t>But doesn’t have data easily accessible</a:t>
             </a:r>
           </a:p>
         </p:txBody>
@@ -1290,7 +2091,7 @@
           <a:p>
             <a:fld id="{061BAA8C-FDC6-D345-B4E0-3B02449209FB}" type="slidenum">
               <a:rPr lang="en-US" smtClean="0"/>
-              <a:t>6</a:t>
+              <a:t>8</a:t>
             </a:fld>
             <a:endParaRPr lang="en-US"/>
           </a:p>
@@ -1309,7 +2110,7 @@
 </p:notes>
 </file>
 
-<file path=ppt/notesSlides/notesSlide7.xml><?xml version="1.0" encoding="utf-8"?>
+<file path=ppt/notesSlides/notesSlide9.xml><?xml version="1.0" encoding="utf-8"?>
 <p:notes xmlns:a="http://schemas.openxmlformats.org/drawingml/2006/main" xmlns:r="http://schemas.openxmlformats.org/officeDocument/2006/relationships" xmlns:p="http://schemas.openxmlformats.org/presentationml/2006/main">
   <p:cSld>
     <p:spTree>
@@ -1398,7 +2199,7 @@
           <a:p>
             <a:fld id="{061BAA8C-FDC6-D345-B4E0-3B02449209FB}" type="slidenum">
               <a:rPr lang="en-US" smtClean="0"/>
-              <a:t>7</a:t>
+              <a:t>9</a:t>
             </a:fld>
             <a:endParaRPr lang="en-US"/>
           </a:p>
@@ -1408,249 +2209,6 @@
     <p:extLst>
       <p:ext uri="{BB962C8B-B14F-4D97-AF65-F5344CB8AC3E}">
         <p14:creationId xmlns:p14="http://schemas.microsoft.com/office/powerpoint/2010/main" val="4123774290"/>
-      </p:ext>
-    </p:extLst>
-  </p:cSld>
-  <p:clrMapOvr>
-    <a:masterClrMapping/>
-  </p:clrMapOvr>
-</p:notes>
-</file>
-
-<file path=ppt/notesSlides/notesSlide8.xml><?xml version="1.0" encoding="utf-8"?>
-<p:notes xmlns:a="http://schemas.openxmlformats.org/drawingml/2006/main" xmlns:r="http://schemas.openxmlformats.org/officeDocument/2006/relationships" xmlns:p="http://schemas.openxmlformats.org/presentationml/2006/main">
-  <p:cSld>
-    <p:spTree>
-      <p:nvGrpSpPr>
-        <p:cNvPr id="1" name="">
-          <a:extLst>
-            <a:ext uri="{FF2B5EF4-FFF2-40B4-BE49-F238E27FC236}">
-              <a16:creationId xmlns:a16="http://schemas.microsoft.com/office/drawing/2014/main" id="{9BE7A472-7C6D-1D0D-8166-7DEE2D7E4098}"/>
-            </a:ext>
-          </a:extLst>
-        </p:cNvPr>
-        <p:cNvGrpSpPr/>
-        <p:nvPr/>
-      </p:nvGrpSpPr>
-      <p:grpSpPr>
-        <a:xfrm>
-          <a:off x="0" y="0"/>
-          <a:ext cx="0" cy="0"/>
-          <a:chOff x="0" y="0"/>
-          <a:chExt cx="0" cy="0"/>
-        </a:xfrm>
-      </p:grpSpPr>
-      <p:sp>
-        <p:nvSpPr>
-          <p:cNvPr id="2" name="Slide Image Placeholder 1">
-            <a:extLst>
-              <a:ext uri="{FF2B5EF4-FFF2-40B4-BE49-F238E27FC236}">
-                <a16:creationId xmlns:a16="http://schemas.microsoft.com/office/drawing/2014/main" id="{59263287-124F-3C48-EFD6-A54B705ACCA2}"/>
-              </a:ext>
-            </a:extLst>
-          </p:cNvPr>
-          <p:cNvSpPr>
-            <a:spLocks noGrp="1" noRot="1" noChangeAspect="1"/>
-          </p:cNvSpPr>
-          <p:nvPr>
-            <p:ph type="sldImg"/>
-          </p:nvPr>
-        </p:nvSpPr>
-        <p:spPr/>
-      </p:sp>
-      <p:sp>
-        <p:nvSpPr>
-          <p:cNvPr id="3" name="Notes Placeholder 2">
-            <a:extLst>
-              <a:ext uri="{FF2B5EF4-FFF2-40B4-BE49-F238E27FC236}">
-                <a16:creationId xmlns:a16="http://schemas.microsoft.com/office/drawing/2014/main" id="{43CCBFB9-D3BD-0989-5862-F9B24D114053}"/>
-              </a:ext>
-            </a:extLst>
-          </p:cNvPr>
-          <p:cNvSpPr>
-            <a:spLocks noGrp="1"/>
-          </p:cNvSpPr>
-          <p:nvPr>
-            <p:ph type="body" idx="1"/>
-          </p:nvPr>
-        </p:nvSpPr>
-        <p:spPr/>
-        <p:txBody>
-          <a:bodyPr/>
-          <a:lstStyle/>
-          <a:p>
-            <a:pPr marL="0" marR="0" lvl="0" indent="0" algn="l" defTabSz="914400" rtl="0" eaLnBrk="1" fontAlgn="auto" latinLnBrk="0" hangingPunct="1">
-              <a:lnSpc>
-                <a:spcPct val="100000"/>
-              </a:lnSpc>
-              <a:spcBef>
-                <a:spcPts val="0"/>
-              </a:spcBef>
-              <a:spcAft>
-                <a:spcPts val="0"/>
-              </a:spcAft>
-              <a:buClrTx/>
-              <a:buSzTx/>
-              <a:buFont typeface="+mj-lt"/>
-              <a:buNone/>
-              <a:tabLst/>
-              <a:defRPr/>
-            </a:pPr>
-            <a:endParaRPr lang="en-US" b="0" i="0" u="none" strike="noStrike" dirty="0">
-              <a:solidFill>
-                <a:srgbClr val="212121"/>
-              </a:solidFill>
-              <a:effectLst/>
-              <a:latin typeface="Cambria" panose="02040503050406030204" pitchFamily="18" charset="0"/>
-            </a:endParaRPr>
-          </a:p>
-        </p:txBody>
-      </p:sp>
-      <p:sp>
-        <p:nvSpPr>
-          <p:cNvPr id="4" name="Slide Number Placeholder 3">
-            <a:extLst>
-              <a:ext uri="{FF2B5EF4-FFF2-40B4-BE49-F238E27FC236}">
-                <a16:creationId xmlns:a16="http://schemas.microsoft.com/office/drawing/2014/main" id="{7483D8B0-5836-C834-58B4-BE6969D92772}"/>
-              </a:ext>
-            </a:extLst>
-          </p:cNvPr>
-          <p:cNvSpPr>
-            <a:spLocks noGrp="1"/>
-          </p:cNvSpPr>
-          <p:nvPr>
-            <p:ph type="sldNum" sz="quarter" idx="5"/>
-          </p:nvPr>
-        </p:nvSpPr>
-        <p:spPr/>
-        <p:txBody>
-          <a:bodyPr/>
-          <a:lstStyle/>
-          <a:p>
-            <a:fld id="{061BAA8C-FDC6-D345-B4E0-3B02449209FB}" type="slidenum">
-              <a:rPr lang="en-US" smtClean="0"/>
-              <a:t>8</a:t>
-            </a:fld>
-            <a:endParaRPr lang="en-US"/>
-          </a:p>
-        </p:txBody>
-      </p:sp>
-    </p:spTree>
-    <p:extLst>
-      <p:ext uri="{BB962C8B-B14F-4D97-AF65-F5344CB8AC3E}">
-        <p14:creationId xmlns:p14="http://schemas.microsoft.com/office/powerpoint/2010/main" val="2053035694"/>
-      </p:ext>
-    </p:extLst>
-  </p:cSld>
-  <p:clrMapOvr>
-    <a:masterClrMapping/>
-  </p:clrMapOvr>
-</p:notes>
-</file>
-
-<file path=ppt/notesSlides/notesSlide9.xml><?xml version="1.0" encoding="utf-8"?>
-<p:notes xmlns:a="http://schemas.openxmlformats.org/drawingml/2006/main" xmlns:r="http://schemas.openxmlformats.org/officeDocument/2006/relationships" xmlns:p="http://schemas.openxmlformats.org/presentationml/2006/main">
-  <p:cSld>
-    <p:spTree>
-      <p:nvGrpSpPr>
-        <p:cNvPr id="1" name="">
-          <a:extLst>
-            <a:ext uri="{FF2B5EF4-FFF2-40B4-BE49-F238E27FC236}">
-              <a16:creationId xmlns:a16="http://schemas.microsoft.com/office/drawing/2014/main" id="{3415C166-0F50-E043-8950-9F266C4565AE}"/>
-            </a:ext>
-          </a:extLst>
-        </p:cNvPr>
-        <p:cNvGrpSpPr/>
-        <p:nvPr/>
-      </p:nvGrpSpPr>
-      <p:grpSpPr>
-        <a:xfrm>
-          <a:off x="0" y="0"/>
-          <a:ext cx="0" cy="0"/>
-          <a:chOff x="0" y="0"/>
-          <a:chExt cx="0" cy="0"/>
-        </a:xfrm>
-      </p:grpSpPr>
-      <p:sp>
-        <p:nvSpPr>
-          <p:cNvPr id="2" name="Slide Image Placeholder 1">
-            <a:extLst>
-              <a:ext uri="{FF2B5EF4-FFF2-40B4-BE49-F238E27FC236}">
-                <a16:creationId xmlns:a16="http://schemas.microsoft.com/office/drawing/2014/main" id="{1E497E09-6D11-D0BA-D2D1-5B08FB997731}"/>
-              </a:ext>
-            </a:extLst>
-          </p:cNvPr>
-          <p:cNvSpPr>
-            <a:spLocks noGrp="1" noRot="1" noChangeAspect="1"/>
-          </p:cNvSpPr>
-          <p:nvPr>
-            <p:ph type="sldImg"/>
-          </p:nvPr>
-        </p:nvSpPr>
-        <p:spPr/>
-      </p:sp>
-      <p:sp>
-        <p:nvSpPr>
-          <p:cNvPr id="3" name="Notes Placeholder 2">
-            <a:extLst>
-              <a:ext uri="{FF2B5EF4-FFF2-40B4-BE49-F238E27FC236}">
-                <a16:creationId xmlns:a16="http://schemas.microsoft.com/office/drawing/2014/main" id="{9336C4A5-58A4-D062-54A6-1D67A978E992}"/>
-              </a:ext>
-            </a:extLst>
-          </p:cNvPr>
-          <p:cNvSpPr>
-            <a:spLocks noGrp="1"/>
-          </p:cNvSpPr>
-          <p:nvPr>
-            <p:ph type="body" idx="1"/>
-          </p:nvPr>
-        </p:nvSpPr>
-        <p:spPr/>
-        <p:txBody>
-          <a:bodyPr/>
-          <a:lstStyle/>
-          <a:p>
-            <a:pPr marL="1371600" lvl="2" indent="-457200">
-              <a:buFont typeface="+mj-lt"/>
-              <a:buAutoNum type="alphaLcParenR"/>
-            </a:pPr>
-            <a:endParaRPr lang="en-US" dirty="0"/>
-          </a:p>
-        </p:txBody>
-      </p:sp>
-      <p:sp>
-        <p:nvSpPr>
-          <p:cNvPr id="4" name="Slide Number Placeholder 3">
-            <a:extLst>
-              <a:ext uri="{FF2B5EF4-FFF2-40B4-BE49-F238E27FC236}">
-                <a16:creationId xmlns:a16="http://schemas.microsoft.com/office/drawing/2014/main" id="{9F3FD3E1-ECA8-7789-76B9-A150DB6276EE}"/>
-              </a:ext>
-            </a:extLst>
-          </p:cNvPr>
-          <p:cNvSpPr>
-            <a:spLocks noGrp="1"/>
-          </p:cNvSpPr>
-          <p:nvPr>
-            <p:ph type="sldNum" sz="quarter" idx="5"/>
-          </p:nvPr>
-        </p:nvSpPr>
-        <p:spPr/>
-        <p:txBody>
-          <a:bodyPr/>
-          <a:lstStyle/>
-          <a:p>
-            <a:fld id="{061BAA8C-FDC6-D345-B4E0-3B02449209FB}" type="slidenum">
-              <a:rPr lang="en-US" smtClean="0"/>
-              <a:t>9</a:t>
-            </a:fld>
-            <a:endParaRPr lang="en-US"/>
-          </a:p>
-        </p:txBody>
-      </p:sp>
-    </p:spTree>
-    <p:extLst>
-      <p:ext uri="{BB962C8B-B14F-4D97-AF65-F5344CB8AC3E}">
-        <p14:creationId xmlns:p14="http://schemas.microsoft.com/office/powerpoint/2010/main" val="3100438651"/>
       </p:ext>
     </p:extLst>
   </p:cSld>
@@ -1807,7 +2365,7 @@
           <a:p>
             <a:fld id="{80FC6068-BAFB-FC44-B9D8-F4B3BB105DE6}" type="datetimeFigureOut">
               <a:rPr lang="en-US" smtClean="0"/>
-              <a:t>11/15/24</a:t>
+              <a:t>11/18/24</a:t>
             </a:fld>
             <a:endParaRPr lang="en-US"/>
           </a:p>
@@ -2005,7 +2563,7 @@
           <a:p>
             <a:fld id="{80FC6068-BAFB-FC44-B9D8-F4B3BB105DE6}" type="datetimeFigureOut">
               <a:rPr lang="en-US" smtClean="0"/>
-              <a:t>11/15/24</a:t>
+              <a:t>11/18/24</a:t>
             </a:fld>
             <a:endParaRPr lang="en-US"/>
           </a:p>
@@ -2213,7 +2771,7 @@
           <a:p>
             <a:fld id="{80FC6068-BAFB-FC44-B9D8-F4B3BB105DE6}" type="datetimeFigureOut">
               <a:rPr lang="en-US" smtClean="0"/>
-              <a:t>11/15/24</a:t>
+              <a:t>11/18/24</a:t>
             </a:fld>
             <a:endParaRPr lang="en-US"/>
           </a:p>
@@ -2417,7 +2975,7 @@
           <a:p>
             <a:fld id="{80FC6068-BAFB-FC44-B9D8-F4B3BB105DE6}" type="datetimeFigureOut">
               <a:rPr lang="en-US" smtClean="0"/>
-              <a:t>11/15/24</a:t>
+              <a:t>11/18/24</a:t>
             </a:fld>
             <a:endParaRPr lang="en-US"/>
           </a:p>
@@ -2708,7 +3266,7 @@
           <a:p>
             <a:fld id="{80FC6068-BAFB-FC44-B9D8-F4B3BB105DE6}" type="datetimeFigureOut">
               <a:rPr lang="en-US" smtClean="0"/>
-              <a:t>11/15/24</a:t>
+              <a:t>11/18/24</a:t>
             </a:fld>
             <a:endParaRPr lang="en-US"/>
           </a:p>
@@ -2973,7 +3531,7 @@
           <a:p>
             <a:fld id="{80FC6068-BAFB-FC44-B9D8-F4B3BB105DE6}" type="datetimeFigureOut">
               <a:rPr lang="en-US" smtClean="0"/>
-              <a:t>11/15/24</a:t>
+              <a:t>11/18/24</a:t>
             </a:fld>
             <a:endParaRPr lang="en-US"/>
           </a:p>
@@ -3385,7 +3943,7 @@
           <a:p>
             <a:fld id="{80FC6068-BAFB-FC44-B9D8-F4B3BB105DE6}" type="datetimeFigureOut">
               <a:rPr lang="en-US" smtClean="0"/>
-              <a:t>11/15/24</a:t>
+              <a:t>11/18/24</a:t>
             </a:fld>
             <a:endParaRPr lang="en-US"/>
           </a:p>
@@ -3526,7 +4084,7 @@
           <a:p>
             <a:fld id="{80FC6068-BAFB-FC44-B9D8-F4B3BB105DE6}" type="datetimeFigureOut">
               <a:rPr lang="en-US" smtClean="0"/>
-              <a:t>11/15/24</a:t>
+              <a:t>11/18/24</a:t>
             </a:fld>
             <a:endParaRPr lang="en-US"/>
           </a:p>
@@ -3639,7 +4197,7 @@
           <a:p>
             <a:fld id="{80FC6068-BAFB-FC44-B9D8-F4B3BB105DE6}" type="datetimeFigureOut">
               <a:rPr lang="en-US" smtClean="0"/>
-              <a:t>11/15/24</a:t>
+              <a:t>11/18/24</a:t>
             </a:fld>
             <a:endParaRPr lang="en-US"/>
           </a:p>
@@ -3950,7 +4508,7 @@
           <a:p>
             <a:fld id="{80FC6068-BAFB-FC44-B9D8-F4B3BB105DE6}" type="datetimeFigureOut">
               <a:rPr lang="en-US" smtClean="0"/>
-              <a:t>11/15/24</a:t>
+              <a:t>11/18/24</a:t>
             </a:fld>
             <a:endParaRPr lang="en-US"/>
           </a:p>
@@ -4238,7 +4796,7 @@
           <a:p>
             <a:fld id="{80FC6068-BAFB-FC44-B9D8-F4B3BB105DE6}" type="datetimeFigureOut">
               <a:rPr lang="en-US" smtClean="0"/>
-              <a:t>11/15/24</a:t>
+              <a:t>11/18/24</a:t>
             </a:fld>
             <a:endParaRPr lang="en-US"/>
           </a:p>
@@ -4479,7 +5037,7 @@
           <a:p>
             <a:fld id="{80FC6068-BAFB-FC44-B9D8-F4B3BB105DE6}" type="datetimeFigureOut">
               <a:rPr lang="en-US" smtClean="0"/>
-              <a:t>11/15/24</a:t>
+              <a:t>11/18/24</a:t>
             </a:fld>
             <a:endParaRPr lang="en-US"/>
           </a:p>
@@ -4979,6 +5537,298 @@
 </p:sld>
 </file>
 
+<file path=ppt/slides/slide10.xml><?xml version="1.0" encoding="utf-8"?>
+<p:sld xmlns:a="http://schemas.openxmlformats.org/drawingml/2006/main" xmlns:r="http://schemas.openxmlformats.org/officeDocument/2006/relationships" xmlns:p="http://schemas.openxmlformats.org/presentationml/2006/main">
+  <p:cSld>
+    <p:spTree>
+      <p:nvGrpSpPr>
+        <p:cNvPr id="1" name="">
+          <a:extLst>
+            <a:ext uri="{FF2B5EF4-FFF2-40B4-BE49-F238E27FC236}">
+              <a16:creationId xmlns:a16="http://schemas.microsoft.com/office/drawing/2014/main" id="{5633E036-3839-DA46-D262-5E5444CCC10D}"/>
+            </a:ext>
+          </a:extLst>
+        </p:cNvPr>
+        <p:cNvGrpSpPr/>
+        <p:nvPr/>
+      </p:nvGrpSpPr>
+      <p:grpSpPr>
+        <a:xfrm>
+          <a:off x="0" y="0"/>
+          <a:ext cx="0" cy="0"/>
+          <a:chOff x="0" y="0"/>
+          <a:chExt cx="0" cy="0"/>
+        </a:xfrm>
+      </p:grpSpPr>
+      <p:sp>
+        <p:nvSpPr>
+          <p:cNvPr id="2" name="Content Placeholder 2">
+            <a:extLst>
+              <a:ext uri="{FF2B5EF4-FFF2-40B4-BE49-F238E27FC236}">
+                <a16:creationId xmlns:a16="http://schemas.microsoft.com/office/drawing/2014/main" id="{BF24A4FC-5006-DE1F-6CE4-C7F9DF72A1D4}"/>
+              </a:ext>
+            </a:extLst>
+          </p:cNvPr>
+          <p:cNvSpPr>
+            <a:spLocks noGrp="1"/>
+          </p:cNvSpPr>
+          <p:nvPr>
+            <p:ph idx="1"/>
+          </p:nvPr>
+        </p:nvSpPr>
+        <p:spPr>
+          <a:xfrm>
+            <a:off x="838200" y="1919289"/>
+            <a:ext cx="10160726" cy="4093584"/>
+          </a:xfrm>
+        </p:spPr>
+        <p:txBody>
+          <a:bodyPr>
+            <a:normAutofit/>
+          </a:bodyPr>
+          <a:lstStyle/>
+          <a:p>
+            <a:r>
+              <a:rPr lang="en-US" dirty="0"/>
+              <a:t>Some features are more </a:t>
+            </a:r>
+            <a:r>
+              <a:rPr lang="en-US" dirty="0" err="1"/>
+              <a:t>irAE</a:t>
+            </a:r>
+            <a:r>
+              <a:rPr lang="en-US" dirty="0"/>
+              <a:t>-type specific (baseline analyses)</a:t>
+            </a:r>
+          </a:p>
+          <a:p>
+            <a:pPr lvl="1"/>
+            <a:r>
+              <a:rPr lang="en-US" dirty="0"/>
+              <a:t>CD38</a:t>
+            </a:r>
+            <a:r>
+              <a:rPr lang="en-US" baseline="30000" dirty="0"/>
+              <a:t>hi</a:t>
+            </a:r>
+            <a:r>
+              <a:rPr lang="en-US" dirty="0"/>
+              <a:t>CD127</a:t>
+            </a:r>
+            <a:r>
+              <a:rPr lang="en-US" baseline="30000" dirty="0"/>
+              <a:t>-</a:t>
+            </a:r>
+            <a:r>
+              <a:rPr lang="en-US" dirty="0"/>
+              <a:t> of NN CD8s (thyroid)</a:t>
+            </a:r>
+          </a:p>
+          <a:p>
+            <a:pPr lvl="1"/>
+            <a:r>
+              <a:rPr lang="en-US" b="1" dirty="0"/>
+              <a:t>CM of </a:t>
+            </a:r>
+            <a:r>
+              <a:rPr lang="en-US" b="1" dirty="0" err="1"/>
+              <a:t>Tconv</a:t>
+            </a:r>
+            <a:r>
+              <a:rPr lang="en-US" b="1" dirty="0"/>
+              <a:t> (skin)</a:t>
+            </a:r>
+          </a:p>
+          <a:p>
+            <a:pPr lvl="1"/>
+            <a:r>
+              <a:rPr lang="en-US" b="1" dirty="0"/>
+              <a:t>PD1</a:t>
+            </a:r>
+            <a:r>
+              <a:rPr lang="en-US" b="1" baseline="30000" dirty="0"/>
+              <a:t>+</a:t>
+            </a:r>
+            <a:r>
+              <a:rPr lang="en-US" b="1" dirty="0"/>
+              <a:t> of NKs (pneumonitis)</a:t>
+            </a:r>
+          </a:p>
+          <a:p>
+            <a:pPr lvl="1"/>
+            <a:r>
+              <a:rPr lang="en-US" b="1" dirty="0"/>
+              <a:t>Naïve of B cells (rheumatoid)</a:t>
+            </a:r>
+          </a:p>
+          <a:p>
+            <a:pPr lvl="1"/>
+            <a:r>
+              <a:rPr lang="en-US" dirty="0"/>
+              <a:t>Combination of a few features’ frequencies can distinguish between (general) yes vs. no </a:t>
+            </a:r>
+            <a:r>
+              <a:rPr lang="en-US" dirty="0" err="1"/>
+              <a:t>irAE</a:t>
+            </a:r>
+            <a:endParaRPr lang="en-US" dirty="0"/>
+          </a:p>
+          <a:p>
+            <a:pPr marL="0" indent="0">
+              <a:buNone/>
+            </a:pPr>
+            <a:endParaRPr lang="en-US" dirty="0"/>
+          </a:p>
+        </p:txBody>
+      </p:sp>
+      <p:sp>
+        <p:nvSpPr>
+          <p:cNvPr id="19" name="Title 18">
+            <a:extLst>
+              <a:ext uri="{FF2B5EF4-FFF2-40B4-BE49-F238E27FC236}">
+                <a16:creationId xmlns:a16="http://schemas.microsoft.com/office/drawing/2014/main" id="{ED9E63E8-95CE-34C4-A282-6BB21360CB1E}"/>
+              </a:ext>
+            </a:extLst>
+          </p:cNvPr>
+          <p:cNvSpPr>
+            <a:spLocks noGrp="1"/>
+          </p:cNvSpPr>
+          <p:nvPr>
+            <p:ph type="title"/>
+          </p:nvPr>
+        </p:nvSpPr>
+        <p:spPr/>
+        <p:txBody>
+          <a:bodyPr/>
+          <a:lstStyle/>
+          <a:p>
+            <a:r>
+              <a:rPr lang="en-US" dirty="0"/>
+              <a:t>Conclusions</a:t>
+            </a:r>
+          </a:p>
+        </p:txBody>
+      </p:sp>
+    </p:spTree>
+    <p:extLst>
+      <p:ext uri="{BB962C8B-B14F-4D97-AF65-F5344CB8AC3E}">
+        <p14:creationId xmlns:p14="http://schemas.microsoft.com/office/powerpoint/2010/main" val="1226241468"/>
+      </p:ext>
+    </p:extLst>
+  </p:cSld>
+  <p:clrMapOvr>
+    <a:masterClrMapping/>
+  </p:clrMapOvr>
+</p:sld>
+</file>
+
+<file path=ppt/slides/slide11.xml><?xml version="1.0" encoding="utf-8"?>
+<p:sld xmlns:a="http://schemas.openxmlformats.org/drawingml/2006/main" xmlns:r="http://schemas.openxmlformats.org/officeDocument/2006/relationships" xmlns:p="http://schemas.openxmlformats.org/presentationml/2006/main">
+  <p:cSld>
+    <p:spTree>
+      <p:nvGrpSpPr>
+        <p:cNvPr id="1" name="">
+          <a:extLst>
+            <a:ext uri="{FF2B5EF4-FFF2-40B4-BE49-F238E27FC236}">
+              <a16:creationId xmlns:a16="http://schemas.microsoft.com/office/drawing/2014/main" id="{5F63F271-7169-1115-1EF3-CE3BF477816E}"/>
+            </a:ext>
+          </a:extLst>
+        </p:cNvPr>
+        <p:cNvGrpSpPr/>
+        <p:nvPr/>
+      </p:nvGrpSpPr>
+      <p:grpSpPr>
+        <a:xfrm>
+          <a:off x="0" y="0"/>
+          <a:ext cx="0" cy="0"/>
+          <a:chOff x="0" y="0"/>
+          <a:chExt cx="0" cy="0"/>
+        </a:xfrm>
+      </p:grpSpPr>
+      <p:sp>
+        <p:nvSpPr>
+          <p:cNvPr id="6" name="Title 5">
+            <a:extLst>
+              <a:ext uri="{FF2B5EF4-FFF2-40B4-BE49-F238E27FC236}">
+                <a16:creationId xmlns:a16="http://schemas.microsoft.com/office/drawing/2014/main" id="{B9AD7D28-49C2-0B8B-79CB-FA2C8F40B6BC}"/>
+              </a:ext>
+            </a:extLst>
+          </p:cNvPr>
+          <p:cNvSpPr>
+            <a:spLocks noGrp="1"/>
+          </p:cNvSpPr>
+          <p:nvPr>
+            <p:ph type="title"/>
+          </p:nvPr>
+        </p:nvSpPr>
+        <p:spPr>
+          <a:xfrm>
+            <a:off x="838200" y="365125"/>
+            <a:ext cx="10279455" cy="1825625"/>
+          </a:xfrm>
+        </p:spPr>
+        <p:txBody>
+          <a:bodyPr>
+            <a:normAutofit/>
+          </a:bodyPr>
+          <a:lstStyle/>
+          <a:p>
+            <a:r>
+              <a:rPr lang="en-US" dirty="0"/>
+              <a:t>Next steps</a:t>
+            </a:r>
+          </a:p>
+        </p:txBody>
+      </p:sp>
+      <p:sp>
+        <p:nvSpPr>
+          <p:cNvPr id="2" name="Content Placeholder 2">
+            <a:extLst>
+              <a:ext uri="{FF2B5EF4-FFF2-40B4-BE49-F238E27FC236}">
+                <a16:creationId xmlns:a16="http://schemas.microsoft.com/office/drawing/2014/main" id="{090FDFCF-AEFD-6D7B-6B89-12A07B49703B}"/>
+              </a:ext>
+            </a:extLst>
+          </p:cNvPr>
+          <p:cNvSpPr>
+            <a:spLocks noGrp="1"/>
+          </p:cNvSpPr>
+          <p:nvPr>
+            <p:ph idx="1"/>
+          </p:nvPr>
+        </p:nvSpPr>
+        <p:spPr>
+          <a:xfrm>
+            <a:off x="838200" y="1919289"/>
+            <a:ext cx="9510656" cy="4499440"/>
+          </a:xfrm>
+        </p:spPr>
+        <p:txBody>
+          <a:bodyPr>
+            <a:normAutofit/>
+          </a:bodyPr>
+          <a:lstStyle/>
+          <a:p>
+            <a:pPr marL="514350" indent="-514350">
+              <a:buFont typeface="+mj-lt"/>
+              <a:buAutoNum type="arabicPeriod"/>
+            </a:pPr>
+            <a:endParaRPr lang="en-US" dirty="0"/>
+          </a:p>
+        </p:txBody>
+      </p:sp>
+    </p:spTree>
+    <p:extLst>
+      <p:ext uri="{BB962C8B-B14F-4D97-AF65-F5344CB8AC3E}">
+        <p14:creationId xmlns:p14="http://schemas.microsoft.com/office/powerpoint/2010/main" val="369226145"/>
+      </p:ext>
+    </p:extLst>
+  </p:cSld>
+  <p:clrMapOvr>
+    <a:masterClrMapping/>
+  </p:clrMapOvr>
+</p:sld>
+</file>
+
 <file path=ppt/slides/slide2.xml><?xml version="1.0" encoding="utf-8"?>
 <p:sld xmlns:a="http://schemas.openxmlformats.org/drawingml/2006/main" xmlns:r="http://schemas.openxmlformats.org/officeDocument/2006/relationships" xmlns:p="http://schemas.openxmlformats.org/presentationml/2006/main">
   <p:cSld>
@@ -5069,7 +5919,18 @@
               <a:buFont typeface="+mj-lt"/>
               <a:buAutoNum type="arabicPeriod"/>
             </a:pPr>
-            <a:endParaRPr lang="en-US" dirty="0"/>
+            <a:r>
+              <a:rPr lang="en-US" dirty="0"/>
+              <a:t>NCI progress: baseline features frequencies delineating specific </a:t>
+            </a:r>
+            <a:r>
+              <a:rPr lang="en-US" dirty="0" err="1"/>
+              <a:t>irAEs</a:t>
+            </a:r>
+            <a:r>
+              <a:rPr lang="en-US" dirty="0"/>
+              <a:t>!</a:t>
+            </a:r>
           </a:p>
         </p:txBody>
       </p:sp>
@@ -5304,6 +6165,115 @@
         <p:cNvPr id="1" name="">
           <a:extLst>
             <a:ext uri="{FF2B5EF4-FFF2-40B4-BE49-F238E27FC236}">
+              <a16:creationId xmlns:a16="http://schemas.microsoft.com/office/drawing/2014/main" id="{BCA56189-83D6-E444-371B-7A9B025E3CE2}"/>
+            </a:ext>
+          </a:extLst>
+        </p:cNvPr>
+        <p:cNvGrpSpPr/>
+        <p:nvPr/>
+      </p:nvGrpSpPr>
+      <p:grpSpPr>
+        <a:xfrm>
+          <a:off x="0" y="0"/>
+          <a:ext cx="0" cy="0"/>
+          <a:chOff x="0" y="0"/>
+          <a:chExt cx="0" cy="0"/>
+        </a:xfrm>
+      </p:grpSpPr>
+      <p:sp>
+        <p:nvSpPr>
+          <p:cNvPr id="6" name="Title 5">
+            <a:extLst>
+              <a:ext uri="{FF2B5EF4-FFF2-40B4-BE49-F238E27FC236}">
+                <a16:creationId xmlns:a16="http://schemas.microsoft.com/office/drawing/2014/main" id="{7C308CCF-9714-0455-8353-7A9F504AC2D7}"/>
+              </a:ext>
+            </a:extLst>
+          </p:cNvPr>
+          <p:cNvSpPr>
+            <a:spLocks noGrp="1"/>
+          </p:cNvSpPr>
+          <p:nvPr>
+            <p:ph type="title"/>
+          </p:nvPr>
+        </p:nvSpPr>
+        <p:spPr>
+          <a:xfrm>
+            <a:off x="838201" y="365125"/>
+            <a:ext cx="10479832" cy="1825625"/>
+          </a:xfrm>
+        </p:spPr>
+        <p:txBody>
+          <a:bodyPr>
+            <a:normAutofit/>
+          </a:bodyPr>
+          <a:lstStyle/>
+          <a:p>
+            <a:r>
+              <a:rPr lang="en-US" dirty="0"/>
+              <a:t>Some features are more </a:t>
+            </a:r>
+            <a:r>
+              <a:rPr lang="en-US" dirty="0" err="1"/>
+              <a:t>irAE</a:t>
+            </a:r>
+            <a:r>
+              <a:rPr lang="en-US" dirty="0"/>
+              <a:t>-type specific (baseline immunotypes)</a:t>
+            </a:r>
+          </a:p>
+        </p:txBody>
+      </p:sp>
+      <p:pic>
+        <p:nvPicPr>
+          <p:cNvPr id="4" name="Picture 3">
+            <a:extLst>
+              <a:ext uri="{FF2B5EF4-FFF2-40B4-BE49-F238E27FC236}">
+                <a16:creationId xmlns:a16="http://schemas.microsoft.com/office/drawing/2014/main" id="{00CF0179-F08A-C8E9-F97B-06CB0F0CDABB}"/>
+              </a:ext>
+            </a:extLst>
+          </p:cNvPr>
+          <p:cNvPicPr>
+            <a:picLocks noChangeAspect="1"/>
+          </p:cNvPicPr>
+          <p:nvPr/>
+        </p:nvPicPr>
+        <p:blipFill>
+          <a:blip r:embed="rId3"/>
+          <a:stretch>
+            <a:fillRect/>
+          </a:stretch>
+        </p:blipFill>
+        <p:spPr>
+          <a:xfrm>
+            <a:off x="2612571" y="1872731"/>
+            <a:ext cx="6242179" cy="4985269"/>
+          </a:xfrm>
+          <a:prstGeom prst="rect">
+            <a:avLst/>
+          </a:prstGeom>
+        </p:spPr>
+      </p:pic>
+    </p:spTree>
+    <p:extLst>
+      <p:ext uri="{BB962C8B-B14F-4D97-AF65-F5344CB8AC3E}">
+        <p14:creationId xmlns:p14="http://schemas.microsoft.com/office/powerpoint/2010/main" val="779647397"/>
+      </p:ext>
+    </p:extLst>
+  </p:cSld>
+  <p:clrMapOvr>
+    <a:masterClrMapping/>
+  </p:clrMapOvr>
+</p:sld>
+</file>
+
+<file path=ppt/slides/slide6.xml><?xml version="1.0" encoding="utf-8"?>
+<p:sld xmlns:a="http://schemas.openxmlformats.org/drawingml/2006/main" xmlns:r="http://schemas.openxmlformats.org/officeDocument/2006/relationships" xmlns:p="http://schemas.openxmlformats.org/presentationml/2006/main">
+  <p:cSld>
+    <p:spTree>
+      <p:nvGrpSpPr>
+        <p:cNvPr id="1" name="">
+          <a:extLst>
+            <a:ext uri="{FF2B5EF4-FFF2-40B4-BE49-F238E27FC236}">
               <a16:creationId xmlns:a16="http://schemas.microsoft.com/office/drawing/2014/main" id="{D72681AD-6B64-A939-D53E-EFC04053267E}"/>
             </a:ext>
           </a:extLst>
@@ -5349,15 +6319,23 @@
           <a:p>
             <a:r>
               <a:rPr lang="en-US" dirty="0"/>
-              <a:t>Whittled down to 4 features (w/ </a:t>
+              <a:t>For general </a:t>
             </a:r>
             <a:r>
               <a:rPr lang="en-US" dirty="0" err="1"/>
-              <a:t>pval</a:t>
+              <a:t>irAEs</a:t>
             </a:r>
             <a:r>
               <a:rPr lang="en-US" dirty="0"/>
-              <a:t> for PC1 still = 0.001)</a:t>
+              <a:t>, whittled down to 4 features (other combinations of </a:t>
+            </a:r>
+            <a:r>
+              <a:rPr lang="en-US" u="sng" dirty="0"/>
+              <a:t>&gt;</a:t>
+            </a:r>
+            <a:r>
+              <a:rPr lang="en-US" dirty="0"/>
+              <a:t> 4 also work)</a:t>
             </a:r>
           </a:p>
         </p:txBody>
@@ -5384,8 +6362,8 @@
         </p:blipFill>
         <p:spPr>
           <a:xfrm>
-            <a:off x="0" y="1684389"/>
-            <a:ext cx="4562669" cy="5173611"/>
+            <a:off x="1" y="1990165"/>
+            <a:ext cx="4293002" cy="4867835"/>
           </a:xfrm>
           <a:prstGeom prst="rect">
             <a:avLst/>
@@ -5452,6 +6430,41 @@
           </a:prstGeom>
         </p:spPr>
       </p:pic>
+      <p:sp>
+        <p:nvSpPr>
+          <p:cNvPr id="2" name="TextBox 1">
+            <a:extLst>
+              <a:ext uri="{FF2B5EF4-FFF2-40B4-BE49-F238E27FC236}">
+                <a16:creationId xmlns:a16="http://schemas.microsoft.com/office/drawing/2014/main" id="{6A47437B-F534-203C-B77B-5711C5DA8E79}"/>
+              </a:ext>
+            </a:extLst>
+          </p:cNvPr>
+          <p:cNvSpPr txBox="1"/>
+          <p:nvPr/>
+        </p:nvSpPr>
+        <p:spPr>
+          <a:xfrm>
+            <a:off x="6242179" y="5449077"/>
+            <a:ext cx="1050288" cy="369332"/>
+          </a:xfrm>
+          <a:prstGeom prst="rect">
+            <a:avLst/>
+          </a:prstGeom>
+          <a:noFill/>
+        </p:spPr>
+        <p:txBody>
+          <a:bodyPr wrap="none" rtlCol="0">
+            <a:spAutoFit/>
+          </a:bodyPr>
+          <a:lstStyle/>
+          <a:p>
+            <a:r>
+              <a:rPr lang="en-US" dirty="0"/>
+              <a:t>P = 0.001</a:t>
+            </a:r>
+          </a:p>
+        </p:txBody>
+      </p:sp>
     </p:spTree>
     <p:extLst>
       <p:ext uri="{BB962C8B-B14F-4D97-AF65-F5344CB8AC3E}">
@@ -5465,7 +6478,386 @@
 </p:sld>
 </file>
 
-<file path=ppt/slides/slide6.xml><?xml version="1.0" encoding="utf-8"?>
+<file path=ppt/slides/slide7.xml><?xml version="1.0" encoding="utf-8"?>
+<p:sld xmlns:a="http://schemas.openxmlformats.org/drawingml/2006/main" xmlns:r="http://schemas.openxmlformats.org/officeDocument/2006/relationships" xmlns:p="http://schemas.openxmlformats.org/presentationml/2006/main">
+  <p:cSld>
+    <p:spTree>
+      <p:nvGrpSpPr>
+        <p:cNvPr id="1" name="">
+          <a:extLst>
+            <a:ext uri="{FF2B5EF4-FFF2-40B4-BE49-F238E27FC236}">
+              <a16:creationId xmlns:a16="http://schemas.microsoft.com/office/drawing/2014/main" id="{91DFB7F7-0B6D-F939-8E19-E2CF1924F53F}"/>
+            </a:ext>
+          </a:extLst>
+        </p:cNvPr>
+        <p:cNvGrpSpPr/>
+        <p:nvPr/>
+      </p:nvGrpSpPr>
+      <p:grpSpPr>
+        <a:xfrm>
+          <a:off x="0" y="0"/>
+          <a:ext cx="0" cy="0"/>
+          <a:chOff x="0" y="0"/>
+          <a:chExt cx="0" cy="0"/>
+        </a:xfrm>
+      </p:grpSpPr>
+      <p:sp>
+        <p:nvSpPr>
+          <p:cNvPr id="6" name="Title 5">
+            <a:extLst>
+              <a:ext uri="{FF2B5EF4-FFF2-40B4-BE49-F238E27FC236}">
+                <a16:creationId xmlns:a16="http://schemas.microsoft.com/office/drawing/2014/main" id="{2BCCCD9B-E520-4348-1B0D-4FAC904C57A6}"/>
+              </a:ext>
+            </a:extLst>
+          </p:cNvPr>
+          <p:cNvSpPr>
+            <a:spLocks noGrp="1"/>
+          </p:cNvSpPr>
+          <p:nvPr>
+            <p:ph type="title"/>
+          </p:nvPr>
+        </p:nvSpPr>
+        <p:spPr>
+          <a:xfrm>
+            <a:off x="838201" y="365125"/>
+            <a:ext cx="10125268" cy="1825625"/>
+          </a:xfrm>
+        </p:spPr>
+        <p:txBody>
+          <a:bodyPr>
+            <a:normAutofit/>
+          </a:bodyPr>
+          <a:lstStyle/>
+          <a:p>
+            <a:r>
+              <a:rPr lang="en-US" dirty="0"/>
+              <a:t>For some specific </a:t>
+            </a:r>
+            <a:r>
+              <a:rPr lang="en-US" dirty="0" err="1"/>
+              <a:t>irAEs</a:t>
+            </a:r>
+            <a:r>
+              <a:rPr lang="en-US" dirty="0"/>
+              <a:t>, a few features’ </a:t>
+            </a:r>
+            <a:r>
+              <a:rPr lang="en-US" dirty="0" err="1"/>
+              <a:t>freqs</a:t>
+            </a:r>
+            <a:r>
+              <a:rPr lang="en-US" dirty="0"/>
+              <a:t> appear distinct between groups at baseline!</a:t>
+            </a:r>
+          </a:p>
+        </p:txBody>
+      </p:sp>
+      <p:pic>
+        <p:nvPicPr>
+          <p:cNvPr id="2" name="Picture 1">
+            <a:extLst>
+              <a:ext uri="{FF2B5EF4-FFF2-40B4-BE49-F238E27FC236}">
+                <a16:creationId xmlns:a16="http://schemas.microsoft.com/office/drawing/2014/main" id="{3B3D1331-B33F-3ABC-437A-2AC5596F0E9A}"/>
+              </a:ext>
+            </a:extLst>
+          </p:cNvPr>
+          <p:cNvPicPr>
+            <a:picLocks noChangeAspect="1"/>
+          </p:cNvPicPr>
+          <p:nvPr/>
+        </p:nvPicPr>
+        <p:blipFill>
+          <a:blip r:embed="rId3"/>
+          <a:stretch>
+            <a:fillRect/>
+          </a:stretch>
+        </p:blipFill>
+        <p:spPr>
+          <a:xfrm>
+            <a:off x="877358" y="2014930"/>
+            <a:ext cx="3985347" cy="2396943"/>
+          </a:xfrm>
+          <a:prstGeom prst="rect">
+            <a:avLst/>
+          </a:prstGeom>
+        </p:spPr>
+      </p:pic>
+      <p:pic>
+        <p:nvPicPr>
+          <p:cNvPr id="4" name="Picture 3">
+            <a:extLst>
+              <a:ext uri="{FF2B5EF4-FFF2-40B4-BE49-F238E27FC236}">
+                <a16:creationId xmlns:a16="http://schemas.microsoft.com/office/drawing/2014/main" id="{D5697712-5ED6-7421-2693-8CDBF17F86F8}"/>
+              </a:ext>
+            </a:extLst>
+          </p:cNvPr>
+          <p:cNvPicPr>
+            <a:picLocks noChangeAspect="1"/>
+          </p:cNvPicPr>
+          <p:nvPr/>
+        </p:nvPicPr>
+        <p:blipFill>
+          <a:blip r:embed="rId4"/>
+          <a:stretch>
+            <a:fillRect/>
+          </a:stretch>
+        </p:blipFill>
+        <p:spPr>
+          <a:xfrm>
+            <a:off x="5198277" y="2014932"/>
+            <a:ext cx="4010269" cy="2396942"/>
+          </a:xfrm>
+          <a:prstGeom prst="rect">
+            <a:avLst/>
+          </a:prstGeom>
+        </p:spPr>
+      </p:pic>
+      <p:pic>
+        <p:nvPicPr>
+          <p:cNvPr id="8" name="Picture 7">
+            <a:extLst>
+              <a:ext uri="{FF2B5EF4-FFF2-40B4-BE49-F238E27FC236}">
+                <a16:creationId xmlns:a16="http://schemas.microsoft.com/office/drawing/2014/main" id="{244057ED-C3BC-FE4F-4A3C-26BEC8E13C40}"/>
+              </a:ext>
+            </a:extLst>
+          </p:cNvPr>
+          <p:cNvPicPr>
+            <a:picLocks noChangeAspect="1"/>
+          </p:cNvPicPr>
+          <p:nvPr/>
+        </p:nvPicPr>
+        <p:blipFill>
+          <a:blip r:embed="rId5"/>
+          <a:stretch>
+            <a:fillRect/>
+          </a:stretch>
+        </p:blipFill>
+        <p:spPr>
+          <a:xfrm>
+            <a:off x="838201" y="4461058"/>
+            <a:ext cx="4021793" cy="2396942"/>
+          </a:xfrm>
+          <a:prstGeom prst="rect">
+            <a:avLst/>
+          </a:prstGeom>
+        </p:spPr>
+      </p:pic>
+      <p:pic>
+        <p:nvPicPr>
+          <p:cNvPr id="12" name="Picture 11">
+            <a:extLst>
+              <a:ext uri="{FF2B5EF4-FFF2-40B4-BE49-F238E27FC236}">
+                <a16:creationId xmlns:a16="http://schemas.microsoft.com/office/drawing/2014/main" id="{9425F9B1-2883-3110-E2D3-D9DFB0C95CA4}"/>
+              </a:ext>
+            </a:extLst>
+          </p:cNvPr>
+          <p:cNvPicPr>
+            <a:picLocks noChangeAspect="1"/>
+          </p:cNvPicPr>
+          <p:nvPr/>
+        </p:nvPicPr>
+        <p:blipFill>
+          <a:blip r:embed="rId6"/>
+          <a:stretch>
+            <a:fillRect/>
+          </a:stretch>
+        </p:blipFill>
+        <p:spPr>
+          <a:xfrm>
+            <a:off x="5198277" y="4581212"/>
+            <a:ext cx="3744290" cy="2276787"/>
+          </a:xfrm>
+          <a:prstGeom prst="rect">
+            <a:avLst/>
+          </a:prstGeom>
+        </p:spPr>
+      </p:pic>
+      <p:sp>
+        <p:nvSpPr>
+          <p:cNvPr id="13" name="TextBox 12">
+            <a:extLst>
+              <a:ext uri="{FF2B5EF4-FFF2-40B4-BE49-F238E27FC236}">
+                <a16:creationId xmlns:a16="http://schemas.microsoft.com/office/drawing/2014/main" id="{A345ACD0-0F1B-5452-D2D0-AF3E8AD914BC}"/>
+              </a:ext>
+            </a:extLst>
+          </p:cNvPr>
+          <p:cNvSpPr txBox="1"/>
+          <p:nvPr/>
+        </p:nvSpPr>
+        <p:spPr>
+          <a:xfrm>
+            <a:off x="1331936" y="1721421"/>
+            <a:ext cx="2699778" cy="369332"/>
+          </a:xfrm>
+          <a:prstGeom prst="rect">
+            <a:avLst/>
+          </a:prstGeom>
+          <a:noFill/>
+        </p:spPr>
+        <p:txBody>
+          <a:bodyPr wrap="none" rtlCol="0">
+            <a:spAutoFit/>
+          </a:bodyPr>
+          <a:lstStyle/>
+          <a:p>
+            <a:r>
+              <a:rPr lang="en-US" dirty="0"/>
+              <a:t>Thyroid (n = 7): </a:t>
+            </a:r>
+            <a:r>
+              <a:rPr lang="en-US" dirty="0" err="1"/>
+              <a:t>padj</a:t>
+            </a:r>
+            <a:r>
+              <a:rPr lang="en-US" dirty="0"/>
+              <a:t> = 0.07</a:t>
+            </a:r>
+          </a:p>
+        </p:txBody>
+      </p:sp>
+      <p:sp>
+        <p:nvSpPr>
+          <p:cNvPr id="14" name="TextBox 13">
+            <a:extLst>
+              <a:ext uri="{FF2B5EF4-FFF2-40B4-BE49-F238E27FC236}">
+                <a16:creationId xmlns:a16="http://schemas.microsoft.com/office/drawing/2014/main" id="{00EADBD3-5CD2-5E5A-2210-50738FCEB952}"/>
+              </a:ext>
+            </a:extLst>
+          </p:cNvPr>
+          <p:cNvSpPr txBox="1"/>
+          <p:nvPr/>
+        </p:nvSpPr>
+        <p:spPr>
+          <a:xfrm>
+            <a:off x="5873800" y="1721421"/>
+            <a:ext cx="2377574" cy="369332"/>
+          </a:xfrm>
+          <a:prstGeom prst="rect">
+            <a:avLst/>
+          </a:prstGeom>
+          <a:noFill/>
+        </p:spPr>
+        <p:txBody>
+          <a:bodyPr wrap="none" rtlCol="0">
+            <a:spAutoFit/>
+          </a:bodyPr>
+          <a:lstStyle/>
+          <a:p>
+            <a:r>
+              <a:rPr lang="en-US" dirty="0"/>
+              <a:t>Skin (n = 9): </a:t>
+            </a:r>
+            <a:r>
+              <a:rPr lang="en-US" dirty="0" err="1"/>
+              <a:t>padj</a:t>
+            </a:r>
+            <a:r>
+              <a:rPr lang="en-US" dirty="0"/>
+              <a:t> = 0.04</a:t>
+            </a:r>
+          </a:p>
+        </p:txBody>
+      </p:sp>
+      <p:sp>
+        <p:nvSpPr>
+          <p:cNvPr id="15" name="TextBox 14">
+            <a:extLst>
+              <a:ext uri="{FF2B5EF4-FFF2-40B4-BE49-F238E27FC236}">
+                <a16:creationId xmlns:a16="http://schemas.microsoft.com/office/drawing/2014/main" id="{BFE69C6C-1935-DF33-3026-C5AE705F7CA7}"/>
+              </a:ext>
+            </a:extLst>
+          </p:cNvPr>
+          <p:cNvSpPr txBox="1"/>
+          <p:nvPr/>
+        </p:nvSpPr>
+        <p:spPr>
+          <a:xfrm>
+            <a:off x="1096257" y="4221090"/>
+            <a:ext cx="3288080" cy="369332"/>
+          </a:xfrm>
+          <a:prstGeom prst="rect">
+            <a:avLst/>
+          </a:prstGeom>
+          <a:noFill/>
+        </p:spPr>
+        <p:txBody>
+          <a:bodyPr wrap="none" rtlCol="0">
+            <a:spAutoFit/>
+          </a:bodyPr>
+          <a:lstStyle/>
+          <a:p>
+            <a:r>
+              <a:rPr lang="en-US" dirty="0"/>
+              <a:t>Pneumonitis (n = 3): </a:t>
+            </a:r>
+            <a:r>
+              <a:rPr lang="en-US" dirty="0" err="1"/>
+              <a:t>padj</a:t>
+            </a:r>
+            <a:r>
+              <a:rPr lang="en-US" dirty="0"/>
+              <a:t> = 0.001</a:t>
+            </a:r>
+          </a:p>
+        </p:txBody>
+      </p:sp>
+      <p:sp>
+        <p:nvSpPr>
+          <p:cNvPr id="16" name="TextBox 15">
+            <a:extLst>
+              <a:ext uri="{FF2B5EF4-FFF2-40B4-BE49-F238E27FC236}">
+                <a16:creationId xmlns:a16="http://schemas.microsoft.com/office/drawing/2014/main" id="{CC2B4C89-F75A-CC0E-B9DC-761B1645E87C}"/>
+              </a:ext>
+            </a:extLst>
+          </p:cNvPr>
+          <p:cNvSpPr txBox="1"/>
+          <p:nvPr/>
+        </p:nvSpPr>
+        <p:spPr>
+          <a:xfrm>
+            <a:off x="5492060" y="4221090"/>
+            <a:ext cx="3141053" cy="369332"/>
+          </a:xfrm>
+          <a:prstGeom prst="rect">
+            <a:avLst/>
+          </a:prstGeom>
+          <a:noFill/>
+        </p:spPr>
+        <p:txBody>
+          <a:bodyPr wrap="none" rtlCol="0">
+            <a:spAutoFit/>
+          </a:bodyPr>
+          <a:lstStyle/>
+          <a:p>
+            <a:r>
+              <a:rPr lang="en-US" dirty="0"/>
+              <a:t>Rheumatoid (n = 3): </a:t>
+            </a:r>
+            <a:r>
+              <a:rPr lang="en-US" dirty="0" err="1"/>
+              <a:t>padj</a:t>
+            </a:r>
+            <a:r>
+              <a:rPr lang="en-US" dirty="0"/>
+              <a:t> = 0.03</a:t>
+            </a:r>
+          </a:p>
+        </p:txBody>
+      </p:sp>
+    </p:spTree>
+    <p:extLst>
+      <p:ext uri="{BB962C8B-B14F-4D97-AF65-F5344CB8AC3E}">
+        <p14:creationId xmlns:p14="http://schemas.microsoft.com/office/powerpoint/2010/main" val="1426762037"/>
+      </p:ext>
+    </p:extLst>
+  </p:cSld>
+  <p:clrMapOvr>
+    <a:masterClrMapping/>
+  </p:clrMapOvr>
+</p:sld>
+</file>
+
+<file path=ppt/slides/slide8.xml><?xml version="1.0" encoding="utf-8"?>
 <p:sld xmlns:a="http://schemas.openxmlformats.org/drawingml/2006/main" xmlns:r="http://schemas.openxmlformats.org/officeDocument/2006/relationships" xmlns:p="http://schemas.openxmlformats.org/presentationml/2006/main">
   <p:cSld>
     <p:spTree>
@@ -5518,7 +6910,15 @@
           <a:p>
             <a:r>
               <a:rPr lang="en-US" dirty="0"/>
-              <a:t>2 potential datasets with necessary features to test our module in</a:t>
+              <a:t>1 potential dataset with necessary features to test 4 feature module (for general </a:t>
+            </a:r>
+            <a:r>
+              <a:rPr lang="en-US" dirty="0" err="1"/>
+              <a:t>irAEs</a:t>
+            </a:r>
+            <a:r>
+              <a:rPr lang="en-US" dirty="0"/>
+              <a:t>) in</a:t>
             </a:r>
           </a:p>
         </p:txBody>
@@ -5545,38 +6945,8 @@
         </p:blipFill>
         <p:spPr>
           <a:xfrm>
-            <a:off x="119743" y="1766995"/>
-            <a:ext cx="6756918" cy="2114179"/>
-          </a:xfrm>
-          <a:prstGeom prst="rect">
-            <a:avLst/>
-          </a:prstGeom>
-        </p:spPr>
-      </p:pic>
-      <p:pic>
-        <p:nvPicPr>
-          <p:cNvPr id="4" name="Picture 3">
-            <a:extLst>
-              <a:ext uri="{FF2B5EF4-FFF2-40B4-BE49-F238E27FC236}">
-                <a16:creationId xmlns:a16="http://schemas.microsoft.com/office/drawing/2014/main" id="{17ED72D2-7301-EB61-6B16-888295FCC4EA}"/>
-              </a:ext>
-            </a:extLst>
-          </p:cNvPr>
-          <p:cNvPicPr>
-            <a:picLocks noChangeAspect="1"/>
-          </p:cNvPicPr>
-          <p:nvPr/>
-        </p:nvPicPr>
-        <p:blipFill>
-          <a:blip r:embed="rId4"/>
-          <a:stretch>
-            <a:fillRect/>
-          </a:stretch>
-        </p:blipFill>
-        <p:spPr>
-          <a:xfrm>
-            <a:off x="3564294" y="4043245"/>
-            <a:ext cx="6756918" cy="2749256"/>
+            <a:off x="1324600" y="2646544"/>
+            <a:ext cx="8939622" cy="2797127"/>
           </a:xfrm>
           <a:prstGeom prst="rect">
             <a:avLst/>
@@ -5596,7 +6966,7 @@
 </p:sld>
 </file>
 
-<file path=ppt/slides/slide7.xml><?xml version="1.0" encoding="utf-8"?>
+<file path=ppt/slides/slide9.xml><?xml version="1.0" encoding="utf-8"?>
 <p:sld xmlns:a="http://schemas.openxmlformats.org/drawingml/2006/main" xmlns:r="http://schemas.openxmlformats.org/officeDocument/2006/relationships" xmlns:p="http://schemas.openxmlformats.org/presentationml/2006/main">
   <p:cSld>
     <p:spTree>
@@ -5684,8 +7054,8 @@
         </p:blipFill>
         <p:spPr>
           <a:xfrm>
-            <a:off x="658716" y="4214651"/>
-            <a:ext cx="6769100" cy="2362200"/>
+            <a:off x="1669933" y="3966081"/>
+            <a:ext cx="7775279" cy="2713324"/>
           </a:xfrm>
           <a:prstGeom prst="rect">
             <a:avLst/>
@@ -5728,7 +7098,7 @@
           <a:p>
             <a:r>
               <a:rPr lang="en-US" dirty="0"/>
-              <a:t>Potentially could look at mean expression of DP PD-1 “module” (and DP CD57 one) but bulk sequencing is limitation here…</a:t>
+              <a:t>Could potentially look at TIGIT, KLRG1, B3GAT1…</a:t>
             </a:r>
           </a:p>
           <a:p>
@@ -5743,245 +7113,6 @@
     <p:extLst>
       <p:ext uri="{BB962C8B-B14F-4D97-AF65-F5344CB8AC3E}">
         <p14:creationId xmlns:p14="http://schemas.microsoft.com/office/powerpoint/2010/main" val="1788887775"/>
-      </p:ext>
-    </p:extLst>
-  </p:cSld>
-  <p:clrMapOvr>
-    <a:masterClrMapping/>
-  </p:clrMapOvr>
-</p:sld>
-</file>
-
-<file path=ppt/slides/slide8.xml><?xml version="1.0" encoding="utf-8"?>
-<p:sld xmlns:a="http://schemas.openxmlformats.org/drawingml/2006/main" xmlns:r="http://schemas.openxmlformats.org/officeDocument/2006/relationships" xmlns:p="http://schemas.openxmlformats.org/presentationml/2006/main">
-  <p:cSld>
-    <p:spTree>
-      <p:nvGrpSpPr>
-        <p:cNvPr id="1" name="">
-          <a:extLst>
-            <a:ext uri="{FF2B5EF4-FFF2-40B4-BE49-F238E27FC236}">
-              <a16:creationId xmlns:a16="http://schemas.microsoft.com/office/drawing/2014/main" id="{5633E036-3839-DA46-D262-5E5444CCC10D}"/>
-            </a:ext>
-          </a:extLst>
-        </p:cNvPr>
-        <p:cNvGrpSpPr/>
-        <p:nvPr/>
-      </p:nvGrpSpPr>
-      <p:grpSpPr>
-        <a:xfrm>
-          <a:off x="0" y="0"/>
-          <a:ext cx="0" cy="0"/>
-          <a:chOff x="0" y="0"/>
-          <a:chExt cx="0" cy="0"/>
-        </a:xfrm>
-      </p:grpSpPr>
-      <p:sp>
-        <p:nvSpPr>
-          <p:cNvPr id="2" name="Content Placeholder 2">
-            <a:extLst>
-              <a:ext uri="{FF2B5EF4-FFF2-40B4-BE49-F238E27FC236}">
-                <a16:creationId xmlns:a16="http://schemas.microsoft.com/office/drawing/2014/main" id="{BF24A4FC-5006-DE1F-6CE4-C7F9DF72A1D4}"/>
-              </a:ext>
-            </a:extLst>
-          </p:cNvPr>
-          <p:cNvSpPr>
-            <a:spLocks noGrp="1"/>
-          </p:cNvSpPr>
-          <p:nvPr>
-            <p:ph idx="1"/>
-          </p:nvPr>
-        </p:nvSpPr>
-        <p:spPr>
-          <a:xfrm>
-            <a:off x="838200" y="1919289"/>
-            <a:ext cx="10160726" cy="4093584"/>
-          </a:xfrm>
-        </p:spPr>
-        <p:txBody>
-          <a:bodyPr>
-            <a:normAutofit/>
-          </a:bodyPr>
-          <a:lstStyle/>
-          <a:p>
-            <a:r>
-              <a:rPr lang="en-US" dirty="0"/>
-              <a:t>Data not shown: also tried baseline pneumonitis (+/- pericardial/pleural effusion) and rheumatoid </a:t>
-            </a:r>
-            <a:r>
-              <a:rPr lang="en-US" dirty="0" err="1"/>
-              <a:t>irAE</a:t>
-            </a:r>
-            <a:r>
-              <a:rPr lang="en-US" dirty="0"/>
-              <a:t> yes vs. no, similar to thyroid </a:t>
-            </a:r>
-            <a:r>
-              <a:rPr lang="en-US" dirty="0" err="1"/>
-              <a:t>irAE</a:t>
-            </a:r>
-            <a:r>
-              <a:rPr lang="en-US" dirty="0"/>
-              <a:t> yes vs. no in that there were weaker results (less patients with these </a:t>
-            </a:r>
-            <a:r>
-              <a:rPr lang="en-US" dirty="0" err="1"/>
-              <a:t>irAEs</a:t>
-            </a:r>
-            <a:r>
-              <a:rPr lang="en-US" dirty="0"/>
-              <a:t> than skin </a:t>
-            </a:r>
-            <a:r>
-              <a:rPr lang="en-US" dirty="0" err="1"/>
-              <a:t>irAEs</a:t>
-            </a:r>
-            <a:r>
-              <a:rPr lang="en-US"/>
-              <a:t>)</a:t>
-            </a:r>
-            <a:endParaRPr lang="en-US" dirty="0"/>
-          </a:p>
-        </p:txBody>
-      </p:sp>
-      <p:sp>
-        <p:nvSpPr>
-          <p:cNvPr id="19" name="Title 18">
-            <a:extLst>
-              <a:ext uri="{FF2B5EF4-FFF2-40B4-BE49-F238E27FC236}">
-                <a16:creationId xmlns:a16="http://schemas.microsoft.com/office/drawing/2014/main" id="{ED9E63E8-95CE-34C4-A282-6BB21360CB1E}"/>
-              </a:ext>
-            </a:extLst>
-          </p:cNvPr>
-          <p:cNvSpPr>
-            <a:spLocks noGrp="1"/>
-          </p:cNvSpPr>
-          <p:nvPr>
-            <p:ph type="title"/>
-          </p:nvPr>
-        </p:nvSpPr>
-        <p:spPr/>
-        <p:txBody>
-          <a:bodyPr/>
-          <a:lstStyle/>
-          <a:p>
-            <a:r>
-              <a:rPr lang="en-US" dirty="0"/>
-              <a:t>Conclusions</a:t>
-            </a:r>
-          </a:p>
-        </p:txBody>
-      </p:sp>
-    </p:spTree>
-    <p:extLst>
-      <p:ext uri="{BB962C8B-B14F-4D97-AF65-F5344CB8AC3E}">
-        <p14:creationId xmlns:p14="http://schemas.microsoft.com/office/powerpoint/2010/main" val="1226241468"/>
-      </p:ext>
-    </p:extLst>
-  </p:cSld>
-  <p:clrMapOvr>
-    <a:masterClrMapping/>
-  </p:clrMapOvr>
-</p:sld>
-</file>
-
-<file path=ppt/slides/slide9.xml><?xml version="1.0" encoding="utf-8"?>
-<p:sld xmlns:a="http://schemas.openxmlformats.org/drawingml/2006/main" xmlns:r="http://schemas.openxmlformats.org/officeDocument/2006/relationships" xmlns:p="http://schemas.openxmlformats.org/presentationml/2006/main">
-  <p:cSld>
-    <p:spTree>
-      <p:nvGrpSpPr>
-        <p:cNvPr id="1" name="">
-          <a:extLst>
-            <a:ext uri="{FF2B5EF4-FFF2-40B4-BE49-F238E27FC236}">
-              <a16:creationId xmlns:a16="http://schemas.microsoft.com/office/drawing/2014/main" id="{5F63F271-7169-1115-1EF3-CE3BF477816E}"/>
-            </a:ext>
-          </a:extLst>
-        </p:cNvPr>
-        <p:cNvGrpSpPr/>
-        <p:nvPr/>
-      </p:nvGrpSpPr>
-      <p:grpSpPr>
-        <a:xfrm>
-          <a:off x="0" y="0"/>
-          <a:ext cx="0" cy="0"/>
-          <a:chOff x="0" y="0"/>
-          <a:chExt cx="0" cy="0"/>
-        </a:xfrm>
-      </p:grpSpPr>
-      <p:sp>
-        <p:nvSpPr>
-          <p:cNvPr id="6" name="Title 5">
-            <a:extLst>
-              <a:ext uri="{FF2B5EF4-FFF2-40B4-BE49-F238E27FC236}">
-                <a16:creationId xmlns:a16="http://schemas.microsoft.com/office/drawing/2014/main" id="{B9AD7D28-49C2-0B8B-79CB-FA2C8F40B6BC}"/>
-              </a:ext>
-            </a:extLst>
-          </p:cNvPr>
-          <p:cNvSpPr>
-            <a:spLocks noGrp="1"/>
-          </p:cNvSpPr>
-          <p:nvPr>
-            <p:ph type="title"/>
-          </p:nvPr>
-        </p:nvSpPr>
-        <p:spPr>
-          <a:xfrm>
-            <a:off x="838200" y="365125"/>
-            <a:ext cx="10279455" cy="1825625"/>
-          </a:xfrm>
-        </p:spPr>
-        <p:txBody>
-          <a:bodyPr>
-            <a:normAutofit/>
-          </a:bodyPr>
-          <a:lstStyle/>
-          <a:p>
-            <a:r>
-              <a:rPr lang="en-US" dirty="0"/>
-              <a:t>Next steps</a:t>
-            </a:r>
-          </a:p>
-        </p:txBody>
-      </p:sp>
-      <p:sp>
-        <p:nvSpPr>
-          <p:cNvPr id="2" name="Content Placeholder 2">
-            <a:extLst>
-              <a:ext uri="{FF2B5EF4-FFF2-40B4-BE49-F238E27FC236}">
-                <a16:creationId xmlns:a16="http://schemas.microsoft.com/office/drawing/2014/main" id="{090FDFCF-AEFD-6D7B-6B89-12A07B49703B}"/>
-              </a:ext>
-            </a:extLst>
-          </p:cNvPr>
-          <p:cNvSpPr>
-            <a:spLocks noGrp="1"/>
-          </p:cNvSpPr>
-          <p:nvPr>
-            <p:ph idx="1"/>
-          </p:nvPr>
-        </p:nvSpPr>
-        <p:spPr>
-          <a:xfrm>
-            <a:off x="838200" y="1919289"/>
-            <a:ext cx="9510656" cy="4499440"/>
-          </a:xfrm>
-        </p:spPr>
-        <p:txBody>
-          <a:bodyPr>
-            <a:normAutofit/>
-          </a:bodyPr>
-          <a:lstStyle/>
-          <a:p>
-            <a:pPr marL="514350" indent="-514350">
-              <a:buFont typeface="+mj-lt"/>
-              <a:buAutoNum type="arabicPeriod"/>
-            </a:pPr>
-            <a:endParaRPr lang="en-US" dirty="0"/>
-          </a:p>
-        </p:txBody>
-      </p:sp>
-    </p:spTree>
-    <p:extLst>
-      <p:ext uri="{BB962C8B-B14F-4D97-AF65-F5344CB8AC3E}">
-        <p14:creationId xmlns:p14="http://schemas.microsoft.com/office/powerpoint/2010/main" val="369226145"/>
       </p:ext>
     </p:extLst>
   </p:cSld>

</xml_diff>